<commit_message>
Riddles for Horashim 2022
</commit_message>
<xml_diff>
--- a/events/Horashim_2022/חידות_הגיון_לניווט_חורשים_2022_סתיו.pptx
+++ b/events/Horashim_2022/חידות_הגיון_לניווט_חורשים_2022_סתיו.pptx
@@ -122,7 +122,7 @@
   </p:defaultTextStyle>
   <p:extLst>
     <p:ext uri="{EFAFB233-063F-42B5-8137-9DF3F51BA10A}">
-      <p15:sldGuideLst xmlns:p15="http://schemas.microsoft.com/office/powerpoint/2012/main" xmlns="">
+      <p15:sldGuideLst xmlns="" xmlns:p15="http://schemas.microsoft.com/office/powerpoint/2012/main">
         <p15:guide id="1" orient="horz" pos="2160">
           <p15:clr>
             <a:srgbClr val="A4A3A4"/>
@@ -321,7 +321,7 @@
             <a:fld id="{61A847B1-4CD3-4D69-9083-8E4347483770}" type="datetimeFigureOut">
               <a:rPr lang="he-IL" smtClean="0"/>
               <a:pPr/>
-              <a:t>ו'/חשון/תשפ"ג</a:t>
+              <a:t>ז'/חשון/תשפ"ג</a:t>
             </a:fld>
             <a:endParaRPr lang="he-IL"/>
           </a:p>
@@ -488,7 +488,7 @@
             <a:fld id="{61A847B1-4CD3-4D69-9083-8E4347483770}" type="datetimeFigureOut">
               <a:rPr lang="he-IL" smtClean="0"/>
               <a:pPr/>
-              <a:t>ו'/חשון/תשפ"ג</a:t>
+              <a:t>ז'/חשון/תשפ"ג</a:t>
             </a:fld>
             <a:endParaRPr lang="he-IL"/>
           </a:p>
@@ -665,7 +665,7 @@
             <a:fld id="{61A847B1-4CD3-4D69-9083-8E4347483770}" type="datetimeFigureOut">
               <a:rPr lang="he-IL" smtClean="0"/>
               <a:pPr/>
-              <a:t>ו'/חשון/תשפ"ג</a:t>
+              <a:t>ז'/חשון/תשפ"ג</a:t>
             </a:fld>
             <a:endParaRPr lang="he-IL"/>
           </a:p>
@@ -832,7 +832,7 @@
             <a:fld id="{61A847B1-4CD3-4D69-9083-8E4347483770}" type="datetimeFigureOut">
               <a:rPr lang="he-IL" smtClean="0"/>
               <a:pPr/>
-              <a:t>ו'/חשון/תשפ"ג</a:t>
+              <a:t>ז'/חשון/תשפ"ג</a:t>
             </a:fld>
             <a:endParaRPr lang="he-IL"/>
           </a:p>
@@ -1075,7 +1075,7 @@
             <a:fld id="{61A847B1-4CD3-4D69-9083-8E4347483770}" type="datetimeFigureOut">
               <a:rPr lang="he-IL" smtClean="0"/>
               <a:pPr/>
-              <a:t>ו'/חשון/תשפ"ג</a:t>
+              <a:t>ז'/חשון/תשפ"ג</a:t>
             </a:fld>
             <a:endParaRPr lang="he-IL"/>
           </a:p>
@@ -1360,7 +1360,7 @@
             <a:fld id="{61A847B1-4CD3-4D69-9083-8E4347483770}" type="datetimeFigureOut">
               <a:rPr lang="he-IL" smtClean="0"/>
               <a:pPr/>
-              <a:t>ו'/חשון/תשפ"ג</a:t>
+              <a:t>ז'/חשון/תשפ"ג</a:t>
             </a:fld>
             <a:endParaRPr lang="he-IL"/>
           </a:p>
@@ -1779,7 +1779,7 @@
             <a:fld id="{61A847B1-4CD3-4D69-9083-8E4347483770}" type="datetimeFigureOut">
               <a:rPr lang="he-IL" smtClean="0"/>
               <a:pPr/>
-              <a:t>ו'/חשון/תשפ"ג</a:t>
+              <a:t>ז'/חשון/תשפ"ג</a:t>
             </a:fld>
             <a:endParaRPr lang="he-IL"/>
           </a:p>
@@ -1894,7 +1894,7 @@
             <a:fld id="{61A847B1-4CD3-4D69-9083-8E4347483770}" type="datetimeFigureOut">
               <a:rPr lang="he-IL" smtClean="0"/>
               <a:pPr/>
-              <a:t>ו'/חשון/תשפ"ג</a:t>
+              <a:t>ז'/חשון/תשפ"ג</a:t>
             </a:fld>
             <a:endParaRPr lang="he-IL"/>
           </a:p>
@@ -1986,7 +1986,7 @@
             <a:fld id="{61A847B1-4CD3-4D69-9083-8E4347483770}" type="datetimeFigureOut">
               <a:rPr lang="he-IL" smtClean="0"/>
               <a:pPr/>
-              <a:t>ו'/חשון/תשפ"ג</a:t>
+              <a:t>ז'/חשון/תשפ"ג</a:t>
             </a:fld>
             <a:endParaRPr lang="he-IL"/>
           </a:p>
@@ -2260,7 +2260,7 @@
             <a:fld id="{61A847B1-4CD3-4D69-9083-8E4347483770}" type="datetimeFigureOut">
               <a:rPr lang="he-IL" smtClean="0"/>
               <a:pPr/>
-              <a:t>ו'/חשון/תשפ"ג</a:t>
+              <a:t>ז'/חשון/תשפ"ג</a:t>
             </a:fld>
             <a:endParaRPr lang="he-IL"/>
           </a:p>
@@ -2510,7 +2510,7 @@
             <a:fld id="{61A847B1-4CD3-4D69-9083-8E4347483770}" type="datetimeFigureOut">
               <a:rPr lang="he-IL" smtClean="0"/>
               <a:pPr/>
-              <a:t>ו'/חשון/תשפ"ג</a:t>
+              <a:t>ז'/חשון/תשפ"ג</a:t>
             </a:fld>
             <a:endParaRPr lang="he-IL"/>
           </a:p>
@@ -2720,7 +2720,7 @@
             <a:fld id="{61A847B1-4CD3-4D69-9083-8E4347483770}" type="datetimeFigureOut">
               <a:rPr lang="he-IL" smtClean="0"/>
               <a:pPr/>
-              <a:t>ו'/חשון/תשפ"ג</a:t>
+              <a:t>ז'/חשון/תשפ"ג</a:t>
             </a:fld>
             <a:endParaRPr lang="he-IL"/>
           </a:p>
@@ -3146,11 +3146,7 @@
             </a:pPr>
             <a:r>
               <a:rPr lang="he-IL" sz="5600" dirty="0" smtClean="0"/>
-              <a:t>סימן במוסלמית פורחת </a:t>
-            </a:r>
-            <a:r>
-              <a:rPr lang="he-IL" sz="5600" dirty="0" smtClean="0"/>
-              <a:t>בסתיו</a:t>
+              <a:t>סימן במוסלמית פורחת בסתיו</a:t>
             </a:r>
           </a:p>
           <a:p>
@@ -3191,31 +3187,7 @@
                 <a:latin typeface="David" pitchFamily="34" charset="-79"/>
                 <a:cs typeface="David" pitchFamily="34" charset="-79"/>
               </a:rPr>
-              <a:t>_ </a:t>
-            </a:r>
-            <a:r>
-              <a:rPr lang="he-IL" sz="8000" dirty="0" smtClean="0">
-                <a:solidFill>
-                  <a:schemeClr val="accent6">
-                    <a:lumMod val="75000"/>
-                  </a:schemeClr>
-                </a:solidFill>
-                <a:latin typeface="David" pitchFamily="34" charset="-79"/>
-                <a:cs typeface="David" pitchFamily="34" charset="-79"/>
-              </a:rPr>
-              <a:t>_ _ _ _ </a:t>
-            </a:r>
-            <a:r>
-              <a:rPr lang="he-IL" sz="8000" dirty="0" smtClean="0">
-                <a:solidFill>
-                  <a:schemeClr val="accent6">
-                    <a:lumMod val="75000"/>
-                  </a:schemeClr>
-                </a:solidFill>
-                <a:latin typeface="David" pitchFamily="34" charset="-79"/>
-                <a:cs typeface="David" pitchFamily="34" charset="-79"/>
-              </a:rPr>
-              <a:t>_ _ </a:t>
+              <a:t>_ _ _ _ _ _ _ </a:t>
             </a:r>
             <a:r>
               <a:rPr lang="he-IL" sz="8000" dirty="0">
@@ -3608,7 +3580,7 @@
         </p:spPr>
         <p:txBody>
           <a:bodyPr>
-            <a:normAutofit fontScale="85000" lnSpcReduction="20000"/>
+            <a:normAutofit fontScale="85000" lnSpcReduction="10000"/>
           </a:bodyPr>
           <a:lstStyle/>
           <a:p>
@@ -3617,16 +3589,15 @@
             </a:pPr>
             <a:r>
               <a:rPr lang="he-IL" sz="6600" dirty="0" smtClean="0"/>
-              <a:t>שחור-כיפה שאף פעם לא מזיל דמעה</a:t>
-            </a:r>
-            <a:endParaRPr lang="he-IL" sz="6600" dirty="0"/>
+              <a:t>תופעה: כשל וצלע לכיוון דרום</a:t>
+            </a:r>
           </a:p>
           <a:p>
             <a:pPr algn="ctr">
               <a:buNone/>
             </a:pPr>
             <a:r>
-              <a:rPr lang="he-IL" sz="8000" dirty="0">
+              <a:rPr lang="he-IL" sz="8000" dirty="0" smtClean="0">
                 <a:solidFill>
                   <a:schemeClr val="accent6">
                     <a:lumMod val="75000"/>
@@ -3635,7 +3606,7 @@
                 <a:latin typeface="David" pitchFamily="34" charset="-79"/>
                 <a:cs typeface="David" pitchFamily="34" charset="-79"/>
               </a:rPr>
-              <a:t>( _ </a:t>
+              <a:t>( </a:t>
             </a:r>
             <a:r>
               <a:rPr lang="he-IL" sz="8000" dirty="0" smtClean="0">
@@ -3647,10 +3618,10 @@
                 <a:latin typeface="David" pitchFamily="34" charset="-79"/>
                 <a:cs typeface="David" pitchFamily="34" charset="-79"/>
               </a:rPr>
-              <a:t>_ _ _ </a:t>
-            </a:r>
-            <a:r>
-              <a:rPr lang="he-IL" sz="8000" dirty="0">
+              <a:t>נ _ </a:t>
+            </a:r>
+            <a:r>
+              <a:rPr lang="he-IL" sz="8000" dirty="0" smtClean="0">
                 <a:solidFill>
                   <a:schemeClr val="accent6">
                     <a:lumMod val="75000"/>
@@ -3659,7 +3630,7 @@
                 <a:latin typeface="David" pitchFamily="34" charset="-79"/>
                 <a:cs typeface="David" pitchFamily="34" charset="-79"/>
               </a:rPr>
-              <a:t>)</a:t>
+              <a:t>_ _ _ )</a:t>
             </a:r>
           </a:p>
           <a:p>
@@ -3838,7 +3809,7 @@
         <p:spPr>
           <a:xfrm>
             <a:off x="609600" y="4495800"/>
-            <a:ext cx="3581400" cy="2123658"/>
+            <a:ext cx="3581400" cy="1692771"/>
           </a:xfrm>
           <a:prstGeom prst="rect">
             <a:avLst/>
@@ -3852,73 +3823,49 @@
           <a:p>
             <a:pPr algn="ctr"/>
             <a:r>
-              <a:rPr lang="he-IL" sz="2400" dirty="0">
-                <a:solidFill>
-                  <a:srgbClr val="0070C0"/>
-                </a:solidFill>
-              </a:rPr>
-              <a:t>פתרון חידה 8</a:t>
-            </a:r>
-          </a:p>
-          <a:p>
-            <a:pPr algn="ctr"/>
-            <a:endParaRPr lang="he-IL" sz="2400" dirty="0">
+              <a:rPr lang="he-IL" sz="2400" dirty="0" smtClean="0">
+                <a:solidFill>
+                  <a:srgbClr val="0070C0"/>
+                </a:solidFill>
+              </a:rPr>
+              <a:t>פתרון חידה </a:t>
+            </a:r>
+            <a:r>
+              <a:rPr lang="he-IL" sz="2400" dirty="0" smtClean="0">
+                <a:solidFill>
+                  <a:srgbClr val="0070C0"/>
+                </a:solidFill>
+              </a:rPr>
+              <a:t>5</a:t>
+            </a:r>
+            <a:endParaRPr lang="he-IL" sz="2400" dirty="0" smtClean="0">
               <a:solidFill>
                 <a:srgbClr val="0070C0"/>
               </a:solidFill>
             </a:endParaRPr>
           </a:p>
           <a:p>
-            <a:pPr algn="ctr">
-              <a:buNone/>
-            </a:pPr>
-            <a:r>
-              <a:rPr lang="he-IL" sz="2800" b="1" dirty="0" smtClean="0">
-                <a:latin typeface="David" pitchFamily="34" charset="-79"/>
-                <a:cs typeface="David" pitchFamily="34" charset="-79"/>
-              </a:rPr>
-              <a:t>הציפור שמה </a:t>
-            </a:r>
-            <a:r>
-              <a:rPr lang="he-IL" sz="2800" b="1" dirty="0" smtClean="0">
-                <a:solidFill>
-                  <a:srgbClr val="FF0000"/>
-                </a:solidFill>
-                <a:latin typeface="David" pitchFamily="34" charset="-79"/>
-                <a:cs typeface="David" pitchFamily="34" charset="-79"/>
-              </a:rPr>
-              <a:t>עין</a:t>
-            </a:r>
-            <a:r>
-              <a:rPr lang="he-IL" sz="2800" b="1" dirty="0" smtClean="0">
-                <a:latin typeface="David" pitchFamily="34" charset="-79"/>
-                <a:cs typeface="David" pitchFamily="34" charset="-79"/>
-              </a:rPr>
-              <a:t> </a:t>
-            </a:r>
-            <a:r>
-              <a:rPr lang="he-IL" sz="2800" b="1" dirty="0" smtClean="0">
-                <a:solidFill>
-                  <a:srgbClr val="00B050"/>
-                </a:solidFill>
-                <a:latin typeface="David" pitchFamily="34" charset="-79"/>
-                <a:cs typeface="David" pitchFamily="34" charset="-79"/>
-              </a:rPr>
-              <a:t>ו</a:t>
-            </a:r>
-            <a:r>
-              <a:rPr lang="he-IL" sz="2800" b="1" dirty="0" smtClean="0">
-                <a:solidFill>
-                  <a:srgbClr val="0070C0"/>
-                </a:solidFill>
-                <a:latin typeface="David" pitchFamily="34" charset="-79"/>
-                <a:cs typeface="David" pitchFamily="34" charset="-79"/>
-              </a:rPr>
-              <a:t>מנהיג דתי</a:t>
-            </a:r>
-            <a:endParaRPr lang="he-IL" sz="2800" b="1" dirty="0">
+            <a:pPr algn="ctr"/>
+            <a:endParaRPr lang="he-IL" sz="2400" dirty="0" smtClean="0">
               <a:solidFill>
                 <a:srgbClr val="0070C0"/>
+              </a:solidFill>
+            </a:endParaRPr>
+          </a:p>
+          <a:p>
+            <a:pPr algn="ctr">
+              <a:buNone/>
+            </a:pPr>
+            <a:r>
+              <a:rPr lang="he-IL" sz="2800" b="1" dirty="0" smtClean="0">
+                <a:latin typeface="David" pitchFamily="34" charset="-79"/>
+                <a:cs typeface="David" pitchFamily="34" charset="-79"/>
+              </a:rPr>
+              <a:t>בתחנה הבאה...</a:t>
+            </a:r>
+            <a:endParaRPr lang="he-IL" sz="2800" b="1" dirty="0" smtClean="0">
+              <a:solidFill>
+                <a:srgbClr val="FF0000"/>
               </a:solidFill>
               <a:latin typeface="David" pitchFamily="34" charset="-79"/>
               <a:cs typeface="David" pitchFamily="34" charset="-79"/>
@@ -3928,30 +3875,6 @@
             <a:pPr algn="ctr">
               <a:buNone/>
             </a:pPr>
-            <a:r>
-              <a:rPr lang="he-IL" sz="2800" b="1" dirty="0" smtClean="0">
-                <a:solidFill>
-                  <a:srgbClr val="FF0000"/>
-                </a:solidFill>
-              </a:rPr>
-              <a:t>ע </a:t>
-            </a:r>
-            <a:r>
-              <a:rPr lang="he-IL" sz="2800" b="1" dirty="0" smtClean="0">
-                <a:solidFill>
-                  <a:srgbClr val="00B050"/>
-                </a:solidFill>
-              </a:rPr>
-              <a:t>ו</a:t>
-            </a:r>
-            <a:r>
-              <a:rPr lang="he-IL" sz="2800" b="1" dirty="0" smtClean="0">
-                <a:solidFill>
-                  <a:srgbClr val="0070C0"/>
-                </a:solidFill>
-              </a:rPr>
-              <a:t> ר ב</a:t>
-            </a:r>
             <a:endParaRPr lang="he-IL" sz="2800" b="1" dirty="0">
               <a:solidFill>
                 <a:srgbClr val="0070C0"/>
@@ -4040,7 +3963,7 @@
             </a:pPr>
             <a:r>
               <a:rPr lang="he-IL" sz="6600" dirty="0" smtClean="0"/>
-              <a:t>עוף שלא התמיד</a:t>
+              <a:t>נשירה בבעלות קבוצה</a:t>
             </a:r>
             <a:endParaRPr lang="he-IL" sz="6600" dirty="0"/>
           </a:p>
@@ -4071,6 +3994,18 @@
                 <a:cs typeface="David" pitchFamily="34" charset="-79"/>
               </a:rPr>
               <a:t>_ _ </a:t>
+            </a:r>
+            <a:r>
+              <a:rPr lang="he-IL" sz="8000" dirty="0" smtClean="0">
+                <a:solidFill>
+                  <a:schemeClr val="accent6">
+                    <a:lumMod val="75000"/>
+                  </a:schemeClr>
+                </a:solidFill>
+                <a:latin typeface="David" pitchFamily="34" charset="-79"/>
+                <a:cs typeface="David" pitchFamily="34" charset="-79"/>
+              </a:rPr>
+              <a:t>_ </a:t>
             </a:r>
             <a:r>
               <a:rPr lang="he-IL" sz="8000" dirty="0">
@@ -4280,8 +4215,21 @@
                   <a:srgbClr val="0070C0"/>
                 </a:solidFill>
               </a:rPr>
-              <a:t>פתרון חידה 9</a:t>
-            </a:r>
+              <a:t>פתרון חידה </a:t>
+            </a:r>
+            <a:r>
+              <a:rPr lang="he-IL" sz="2400" dirty="0" smtClean="0">
+                <a:solidFill>
+                  <a:srgbClr val="0070C0"/>
+                </a:solidFill>
+              </a:rPr>
+              <a:t>5</a:t>
+            </a:r>
+            <a:endParaRPr lang="he-IL" sz="2400" dirty="0">
+              <a:solidFill>
+                <a:srgbClr val="0070C0"/>
+              </a:solidFill>
+            </a:endParaRPr>
           </a:p>
           <a:p>
             <a:pPr algn="ctr"/>
@@ -4296,34 +4244,32 @@
               <a:buNone/>
             </a:pPr>
             <a:r>
-              <a:rPr lang="he-IL" sz="2800" b="1" dirty="0" smtClean="0">
-                <a:solidFill>
-                  <a:srgbClr val="002060"/>
-                </a:solidFill>
-                <a:latin typeface="David" pitchFamily="34" charset="-79"/>
-                <a:cs typeface="David" pitchFamily="34" charset="-79"/>
-              </a:rPr>
-              <a:t>שחור-כיפה ש</a:t>
-            </a:r>
-            <a:r>
-              <a:rPr lang="he-IL" sz="2800" b="1" dirty="0" smtClean="0">
+              <a:rPr lang="he-IL" sz="2800" dirty="0" smtClean="0"/>
+              <a:t>תופעה: </a:t>
+            </a:r>
+            <a:r>
+              <a:rPr lang="he-IL" sz="2800" dirty="0" smtClean="0">
                 <a:solidFill>
                   <a:srgbClr val="FF0000"/>
                 </a:solidFill>
-                <a:latin typeface="David" pitchFamily="34" charset="-79"/>
-                <a:cs typeface="David" pitchFamily="34" charset="-79"/>
-              </a:rPr>
-              <a:t>אף פעם לא </a:t>
-            </a:r>
-            <a:r>
-              <a:rPr lang="he-IL" sz="2800" b="1" dirty="0" smtClean="0">
+              </a:rPr>
+              <a:t>כשל</a:t>
+            </a:r>
+            <a:r>
+              <a:rPr lang="he-IL" sz="2800" dirty="0" smtClean="0"/>
+              <a:t> ו</a:t>
+            </a:r>
+            <a:r>
+              <a:rPr lang="he-IL" sz="2800" dirty="0" smtClean="0">
                 <a:solidFill>
                   <a:srgbClr val="00B050"/>
                 </a:solidFill>
-                <a:latin typeface="David" pitchFamily="34" charset="-79"/>
-                <a:cs typeface="David" pitchFamily="34" charset="-79"/>
-              </a:rPr>
-              <a:t>מזיל דמעה</a:t>
+              </a:rPr>
+              <a:t>צלע</a:t>
+            </a:r>
+            <a:r>
+              <a:rPr lang="he-IL" sz="2800" dirty="0" smtClean="0"/>
+              <a:t> לכיוון דרום</a:t>
             </a:r>
             <a:endParaRPr lang="he-IL" sz="2800" b="1" dirty="0">
               <a:solidFill>
@@ -4343,7 +4289,7 @@
                   <a:srgbClr val="FF0000"/>
                 </a:solidFill>
               </a:rPr>
-              <a:t>ס </a:t>
+              <a:t>נ </a:t>
             </a:r>
             <a:r>
               <a:rPr lang="he-IL" sz="2800" b="1" dirty="0" smtClean="0">
@@ -4351,7 +4297,7 @@
                   <a:srgbClr val="00B050"/>
                 </a:solidFill>
               </a:rPr>
-              <a:t>ב כ י</a:t>
+              <a:t>ד י ד ה</a:t>
             </a:r>
             <a:endParaRPr lang="he-IL" sz="2800" b="1" dirty="0">
               <a:solidFill>
@@ -4458,16 +4404,15 @@
             </a:pPr>
             <a:r>
               <a:rPr lang="he-IL" sz="6600" dirty="0" smtClean="0"/>
-              <a:t>עוף שלא מכבד</a:t>
-            </a:r>
-            <a:endParaRPr lang="he-IL" sz="6600" dirty="0"/>
+              <a:t>נשירה בבעלות קבוצה</a:t>
+            </a:r>
           </a:p>
           <a:p>
             <a:pPr algn="ctr">
               <a:buNone/>
             </a:pPr>
             <a:r>
-              <a:rPr lang="he-IL" sz="8000" dirty="0">
+              <a:rPr lang="he-IL" sz="8000" dirty="0" smtClean="0">
                 <a:solidFill>
                   <a:schemeClr val="accent6">
                     <a:lumMod val="75000"/>
@@ -4476,7 +4421,7 @@
                 <a:latin typeface="David" pitchFamily="34" charset="-79"/>
                 <a:cs typeface="David" pitchFamily="34" charset="-79"/>
               </a:rPr>
-              <a:t>( _ </a:t>
+              <a:t>( </a:t>
             </a:r>
             <a:r>
               <a:rPr lang="he-IL" sz="8000" dirty="0" smtClean="0">
@@ -4488,17 +4433,20 @@
                 <a:latin typeface="David" pitchFamily="34" charset="-79"/>
                 <a:cs typeface="David" pitchFamily="34" charset="-79"/>
               </a:rPr>
-              <a:t>_ )</a:t>
-            </a:r>
-            <a:endParaRPr lang="he-IL" sz="8000" dirty="0">
-              <a:solidFill>
-                <a:schemeClr val="accent6">
-                  <a:lumMod val="75000"/>
-                </a:schemeClr>
-              </a:solidFill>
-              <a:latin typeface="David" pitchFamily="34" charset="-79"/>
-              <a:cs typeface="David" pitchFamily="34" charset="-79"/>
-            </a:endParaRPr>
+              <a:t>ש </a:t>
+            </a:r>
+            <a:r>
+              <a:rPr lang="he-IL" sz="8000" dirty="0" smtClean="0">
+                <a:solidFill>
+                  <a:schemeClr val="accent6">
+                    <a:lumMod val="75000"/>
+                  </a:schemeClr>
+                </a:solidFill>
+                <a:latin typeface="David" pitchFamily="34" charset="-79"/>
+                <a:cs typeface="David" pitchFamily="34" charset="-79"/>
+              </a:rPr>
+              <a:t>_ _ _ )</a:t>
+            </a:r>
           </a:p>
           <a:p>
             <a:pPr>
@@ -4676,7 +4624,7 @@
         <p:spPr>
           <a:xfrm>
             <a:off x="609600" y="4495800"/>
-            <a:ext cx="3352800" cy="1692771"/>
+            <a:ext cx="3352800" cy="1261884"/>
           </a:xfrm>
           <a:prstGeom prst="rect">
             <a:avLst/>
@@ -4690,7 +4638,7 @@
           <a:p>
             <a:pPr algn="ctr"/>
             <a:r>
-              <a:rPr lang="he-IL" sz="2400" dirty="0">
+              <a:rPr lang="he-IL" sz="2400" dirty="0" smtClean="0">
                 <a:solidFill>
                   <a:srgbClr val="0070C0"/>
                 </a:solidFill>
@@ -4703,9 +4651,9 @@
                   <a:srgbClr val="0070C0"/>
                 </a:solidFill>
               </a:rPr>
-              <a:t>10</a:t>
-            </a:r>
-            <a:endParaRPr lang="he-IL" sz="2400" dirty="0">
+              <a:t>6</a:t>
+            </a:r>
+            <a:endParaRPr lang="he-IL" sz="2400" dirty="0" smtClean="0">
               <a:solidFill>
                 <a:srgbClr val="0070C0"/>
               </a:solidFill>
@@ -4713,7 +4661,7 @@
           </a:p>
           <a:p>
             <a:pPr algn="ctr"/>
-            <a:endParaRPr lang="he-IL" sz="2400" dirty="0">
+            <a:endParaRPr lang="he-IL" sz="2400" dirty="0" smtClean="0">
               <a:solidFill>
                 <a:srgbClr val="0070C0"/>
               </a:solidFill>
@@ -4725,48 +4673,17 @@
             </a:pPr>
             <a:r>
               <a:rPr lang="he-IL" sz="2800" b="1" dirty="0" smtClean="0">
-                <a:solidFill>
-                  <a:srgbClr val="002060"/>
-                </a:solidFill>
-                <a:latin typeface="David" pitchFamily="34" charset="-79"/>
-                <a:cs typeface="David" pitchFamily="34" charset="-79"/>
-              </a:rPr>
-              <a:t>עוף </a:t>
-            </a:r>
-            <a:r>
-              <a:rPr lang="he-IL" sz="2800" b="1" dirty="0" smtClean="0">
-                <a:solidFill>
-                  <a:srgbClr val="FF0000"/>
-                </a:solidFill>
-                <a:latin typeface="David" pitchFamily="34" charset="-79"/>
-                <a:cs typeface="David" pitchFamily="34" charset="-79"/>
-              </a:rPr>
-              <a:t>שלא התמיד </a:t>
-            </a:r>
-            <a:endParaRPr lang="he-IL" sz="2800" b="1" dirty="0">
+                <a:latin typeface="David" pitchFamily="34" charset="-79"/>
+                <a:cs typeface="David" pitchFamily="34" charset="-79"/>
+              </a:rPr>
+              <a:t>בתחנה הבאה...</a:t>
+            </a:r>
+            <a:endParaRPr lang="he-IL" sz="2800" b="1" dirty="0" smtClean="0">
               <a:solidFill>
                 <a:srgbClr val="FF0000"/>
               </a:solidFill>
               <a:latin typeface="David" pitchFamily="34" charset="-79"/>
               <a:cs typeface="David" pitchFamily="34" charset="-79"/>
-            </a:endParaRPr>
-          </a:p>
-          <a:p>
-            <a:pPr algn="ctr">
-              <a:buNone/>
-            </a:pPr>
-            <a:r>
-              <a:rPr lang="he-IL" sz="2800" b="1" dirty="0" smtClean="0">
-                <a:solidFill>
-                  <a:srgbClr val="FF0000"/>
-                </a:solidFill>
-              </a:rPr>
-              <a:t>נ ש ר</a:t>
-            </a:r>
-            <a:endParaRPr lang="he-IL" sz="2800" b="1" dirty="0">
-              <a:solidFill>
-                <a:srgbClr val="FF0000"/>
-              </a:solidFill>
             </a:endParaRPr>
           </a:p>
         </p:txBody>
@@ -4859,7 +4776,7 @@
         </p:spPr>
         <p:txBody>
           <a:bodyPr>
-            <a:normAutofit fontScale="92500"/>
+            <a:normAutofit/>
           </a:bodyPr>
           <a:lstStyle/>
           <a:p>
@@ -4868,7 +4785,7 @@
             </a:pPr>
             <a:r>
               <a:rPr lang="he-IL" sz="6600" dirty="0" smtClean="0"/>
-              <a:t>טורף שהתפגר, או ציפור...</a:t>
+              <a:t>עוף נודד מרחם על גפה</a:t>
             </a:r>
             <a:endParaRPr lang="he-IL" sz="6600" dirty="0"/>
           </a:p>
@@ -5116,7 +5033,7 @@
                   <a:srgbClr val="0070C0"/>
                 </a:solidFill>
               </a:rPr>
-              <a:t>11</a:t>
+              <a:t>6</a:t>
             </a:r>
             <a:endParaRPr lang="he-IL" sz="2400" dirty="0">
               <a:solidFill>
@@ -5144,17 +5061,47 @@
                 <a:latin typeface="David" pitchFamily="34" charset="-79"/>
                 <a:cs typeface="David" pitchFamily="34" charset="-79"/>
               </a:rPr>
-              <a:t>עוף </a:t>
+              <a:t>נשירה </a:t>
             </a:r>
             <a:r>
               <a:rPr lang="he-IL" sz="2800" b="1" dirty="0" smtClean="0">
                 <a:solidFill>
+                  <a:srgbClr val="00B050"/>
+                </a:solidFill>
+                <a:latin typeface="David" pitchFamily="34" charset="-79"/>
+                <a:cs typeface="David" pitchFamily="34" charset="-79"/>
+              </a:rPr>
+              <a:t>בבעלות</a:t>
+            </a:r>
+            <a:r>
+              <a:rPr lang="he-IL" sz="2800" b="1" dirty="0" smtClean="0">
+                <a:solidFill>
+                  <a:srgbClr val="002060"/>
+                </a:solidFill>
+                <a:latin typeface="David" pitchFamily="34" charset="-79"/>
+                <a:cs typeface="David" pitchFamily="34" charset="-79"/>
+              </a:rPr>
+              <a:t> </a:t>
+            </a:r>
+            <a:r>
+              <a:rPr lang="he-IL" sz="2800" b="1" dirty="0" smtClean="0">
+                <a:solidFill>
                   <a:srgbClr val="FF0000"/>
                 </a:solidFill>
                 <a:latin typeface="David" pitchFamily="34" charset="-79"/>
                 <a:cs typeface="David" pitchFamily="34" charset="-79"/>
               </a:rPr>
-              <a:t>שלא מכבד </a:t>
+              <a:t>קבוצה</a:t>
+            </a:r>
+            <a:r>
+              <a:rPr lang="he-IL" sz="2800" b="1" dirty="0" smtClean="0">
+                <a:solidFill>
+                  <a:srgbClr val="FF0000"/>
+                </a:solidFill>
+                <a:latin typeface="David" pitchFamily="34" charset="-79"/>
+                <a:cs typeface="David" pitchFamily="34" charset="-79"/>
+              </a:rPr>
+              <a:t> </a:t>
             </a:r>
             <a:endParaRPr lang="he-IL" sz="2800" b="1" dirty="0">
               <a:solidFill>
@@ -5171,10 +5118,18 @@
             <a:r>
               <a:rPr lang="he-IL" sz="2800" b="1" dirty="0" smtClean="0">
                 <a:solidFill>
+                  <a:srgbClr val="00B050"/>
+                </a:solidFill>
+              </a:rPr>
+              <a:t>ש ל </a:t>
+            </a:r>
+            <a:r>
+              <a:rPr lang="he-IL" sz="2800" b="1" dirty="0" smtClean="0">
+                <a:solidFill>
                   <a:srgbClr val="FF0000"/>
                 </a:solidFill>
               </a:rPr>
-              <a:t>ב ז</a:t>
+              <a:t>כ ת</a:t>
             </a:r>
             <a:endParaRPr lang="he-IL" sz="2800" b="1" dirty="0">
               <a:solidFill>
@@ -5272,7 +5227,7 @@
         </p:spPr>
         <p:txBody>
           <a:bodyPr>
-            <a:normAutofit fontScale="92500"/>
+            <a:normAutofit/>
           </a:bodyPr>
           <a:lstStyle/>
           <a:p>
@@ -5281,16 +5236,15 @@
             </a:pPr>
             <a:r>
               <a:rPr lang="he-IL" sz="6600" dirty="0" smtClean="0"/>
-              <a:t>טורף שהתפגר, או ציפור...</a:t>
-            </a:r>
-            <a:endParaRPr lang="he-IL" sz="6600" dirty="0"/>
+              <a:t>עוף נודד מרחם על גפה</a:t>
+            </a:r>
           </a:p>
           <a:p>
             <a:pPr algn="ctr">
               <a:buNone/>
             </a:pPr>
             <a:r>
-              <a:rPr lang="he-IL" sz="8000" dirty="0">
+              <a:rPr lang="he-IL" sz="8000" dirty="0" smtClean="0">
                 <a:solidFill>
                   <a:schemeClr val="accent6">
                     <a:lumMod val="75000"/>
@@ -5299,7 +5253,7 @@
                 <a:latin typeface="David" pitchFamily="34" charset="-79"/>
                 <a:cs typeface="David" pitchFamily="34" charset="-79"/>
               </a:rPr>
-              <a:t>( _ </a:t>
+              <a:t>( </a:t>
             </a:r>
             <a:r>
               <a:rPr lang="he-IL" sz="8000" dirty="0" smtClean="0">
@@ -5311,10 +5265,10 @@
                 <a:latin typeface="David" pitchFamily="34" charset="-79"/>
                 <a:cs typeface="David" pitchFamily="34" charset="-79"/>
               </a:rPr>
-              <a:t>_ _ _ _ </a:t>
-            </a:r>
-            <a:r>
-              <a:rPr lang="he-IL" sz="8000" dirty="0">
+              <a:t>ח _ </a:t>
+            </a:r>
+            <a:r>
+              <a:rPr lang="he-IL" sz="8000" dirty="0" smtClean="0">
                 <a:solidFill>
                   <a:schemeClr val="accent6">
                     <a:lumMod val="75000"/>
@@ -5323,7 +5277,7 @@
                 <a:latin typeface="David" pitchFamily="34" charset="-79"/>
                 <a:cs typeface="David" pitchFamily="34" charset="-79"/>
               </a:rPr>
-              <a:t>)</a:t>
+              <a:t>_ _ _ )</a:t>
             </a:r>
           </a:p>
           <a:p>
@@ -5502,7 +5456,7 @@
         <p:spPr>
           <a:xfrm>
             <a:off x="609600" y="4495800"/>
-            <a:ext cx="3352800" cy="1692771"/>
+            <a:ext cx="3352800" cy="1261884"/>
           </a:xfrm>
           <a:prstGeom prst="rect">
             <a:avLst/>
@@ -5516,22 +5470,22 @@
           <a:p>
             <a:pPr algn="ctr"/>
             <a:r>
-              <a:rPr lang="he-IL" sz="2400" dirty="0">
-                <a:solidFill>
-                  <a:srgbClr val="0070C0"/>
-                </a:solidFill>
-              </a:rPr>
-              <a:t>פתרון חידה </a:t>
-            </a:r>
-            <a:r>
               <a:rPr lang="he-IL" sz="2400" dirty="0" smtClean="0">
                 <a:solidFill>
                   <a:srgbClr val="0070C0"/>
                 </a:solidFill>
               </a:rPr>
-              <a:t>11</a:t>
-            </a:r>
-            <a:endParaRPr lang="he-IL" sz="2400" dirty="0">
+              <a:t>פתרון </a:t>
+            </a:r>
+            <a:r>
+              <a:rPr lang="he-IL" sz="2400" dirty="0" smtClean="0">
+                <a:solidFill>
+                  <a:srgbClr val="0070C0"/>
+                </a:solidFill>
+              </a:rPr>
+              <a:t>חידה 7</a:t>
+            </a:r>
+            <a:endParaRPr lang="he-IL" sz="2400" dirty="0" smtClean="0">
               <a:solidFill>
                 <a:srgbClr val="0070C0"/>
               </a:solidFill>
@@ -5539,7 +5493,7 @@
           </a:p>
           <a:p>
             <a:pPr algn="ctr"/>
-            <a:endParaRPr lang="he-IL" sz="2400" dirty="0">
+            <a:endParaRPr lang="he-IL" sz="2400" dirty="0" smtClean="0">
               <a:solidFill>
                 <a:srgbClr val="0070C0"/>
               </a:solidFill>
@@ -5551,48 +5505,17 @@
             </a:pPr>
             <a:r>
               <a:rPr lang="he-IL" sz="2800" b="1" dirty="0" smtClean="0">
-                <a:solidFill>
-                  <a:srgbClr val="002060"/>
-                </a:solidFill>
-                <a:latin typeface="David" pitchFamily="34" charset="-79"/>
-                <a:cs typeface="David" pitchFamily="34" charset="-79"/>
-              </a:rPr>
-              <a:t>עוף </a:t>
-            </a:r>
-            <a:r>
-              <a:rPr lang="he-IL" sz="2800" b="1" dirty="0" smtClean="0">
-                <a:solidFill>
-                  <a:srgbClr val="FF0000"/>
-                </a:solidFill>
-                <a:latin typeface="David" pitchFamily="34" charset="-79"/>
-                <a:cs typeface="David" pitchFamily="34" charset="-79"/>
-              </a:rPr>
-              <a:t>שלא מכבד </a:t>
-            </a:r>
-            <a:endParaRPr lang="he-IL" sz="2800" b="1" dirty="0">
+                <a:latin typeface="David" pitchFamily="34" charset="-79"/>
+                <a:cs typeface="David" pitchFamily="34" charset="-79"/>
+              </a:rPr>
+              <a:t>בתחנה הבאה...</a:t>
+            </a:r>
+            <a:endParaRPr lang="he-IL" sz="2800" b="1" dirty="0" smtClean="0">
               <a:solidFill>
                 <a:srgbClr val="FF0000"/>
               </a:solidFill>
               <a:latin typeface="David" pitchFamily="34" charset="-79"/>
               <a:cs typeface="David" pitchFamily="34" charset="-79"/>
-            </a:endParaRPr>
-          </a:p>
-          <a:p>
-            <a:pPr algn="ctr">
-              <a:buNone/>
-            </a:pPr>
-            <a:r>
-              <a:rPr lang="he-IL" sz="2800" b="1" dirty="0" smtClean="0">
-                <a:solidFill>
-                  <a:srgbClr val="FF0000"/>
-                </a:solidFill>
-              </a:rPr>
-              <a:t>ב ז</a:t>
-            </a:r>
-            <a:endParaRPr lang="he-IL" sz="2800" b="1" dirty="0">
-              <a:solidFill>
-                <a:srgbClr val="FF0000"/>
-              </a:solidFill>
             </a:endParaRPr>
           </a:p>
         </p:txBody>
@@ -5685,7 +5608,7 @@
         </p:spPr>
         <p:txBody>
           <a:bodyPr>
-            <a:normAutofit fontScale="92500"/>
+            <a:normAutofit/>
           </a:bodyPr>
           <a:lstStyle/>
           <a:p>
@@ -5694,7 +5617,7 @@
             </a:pPr>
             <a:r>
               <a:rPr lang="he-IL" sz="6600" dirty="0" smtClean="0"/>
-              <a:t>טורף שהתפגר, או ציפור...</a:t>
+              <a:t>יוסת אחרת העונה</a:t>
             </a:r>
             <a:endParaRPr lang="he-IL" sz="6600" dirty="0"/>
           </a:p>
@@ -5724,7 +5647,19 @@
                 <a:latin typeface="David" pitchFamily="34" charset="-79"/>
                 <a:cs typeface="David" pitchFamily="34" charset="-79"/>
               </a:rPr>
-              <a:t>_ _ _ _ </a:t>
+              <a:t>_ </a:t>
+            </a:r>
+            <a:r>
+              <a:rPr lang="he-IL" sz="8000" dirty="0" smtClean="0">
+                <a:solidFill>
+                  <a:schemeClr val="accent6">
+                    <a:lumMod val="75000"/>
+                  </a:schemeClr>
+                </a:solidFill>
+                <a:latin typeface="David" pitchFamily="34" charset="-79"/>
+                <a:cs typeface="David" pitchFamily="34" charset="-79"/>
+              </a:rPr>
+              <a:t>_ _ </a:t>
             </a:r>
             <a:r>
               <a:rPr lang="he-IL" sz="8000" dirty="0">
@@ -5929,7 +5864,7 @@
           <a:p>
             <a:pPr algn="ctr"/>
             <a:r>
-              <a:rPr lang="he-IL" sz="2400" dirty="0">
+              <a:rPr lang="he-IL" sz="2400" dirty="0" smtClean="0">
                 <a:solidFill>
                   <a:srgbClr val="0070C0"/>
                 </a:solidFill>
@@ -5942,9 +5877,9 @@
                   <a:srgbClr val="0070C0"/>
                 </a:solidFill>
               </a:rPr>
-              <a:t>11</a:t>
-            </a:r>
-            <a:endParaRPr lang="he-IL" sz="2400" dirty="0">
+              <a:t>7</a:t>
+            </a:r>
+            <a:endParaRPr lang="he-IL" sz="2400" dirty="0" smtClean="0">
               <a:solidFill>
                 <a:srgbClr val="0070C0"/>
               </a:solidFill>
@@ -5952,7 +5887,7 @@
           </a:p>
           <a:p>
             <a:pPr algn="ctr"/>
-            <a:endParaRPr lang="he-IL" sz="2400" dirty="0">
+            <a:endParaRPr lang="he-IL" sz="2400" dirty="0" smtClean="0">
               <a:solidFill>
                 <a:srgbClr val="0070C0"/>
               </a:solidFill>
@@ -5970,17 +5905,47 @@
                 <a:latin typeface="David" pitchFamily="34" charset="-79"/>
                 <a:cs typeface="David" pitchFamily="34" charset="-79"/>
               </a:rPr>
-              <a:t>עוף </a:t>
+              <a:t>עוף נודד </a:t>
             </a:r>
             <a:r>
               <a:rPr lang="he-IL" sz="2800" b="1" dirty="0" smtClean="0">
                 <a:solidFill>
+                  <a:srgbClr val="00B050"/>
+                </a:solidFill>
+                <a:latin typeface="David" pitchFamily="34" charset="-79"/>
+                <a:cs typeface="David" pitchFamily="34" charset="-79"/>
+              </a:rPr>
+              <a:t>מרחם</a:t>
+            </a:r>
+            <a:r>
+              <a:rPr lang="he-IL" sz="2800" b="1" dirty="0" smtClean="0">
+                <a:solidFill>
+                  <a:srgbClr val="002060"/>
+                </a:solidFill>
+                <a:latin typeface="David" pitchFamily="34" charset="-79"/>
+                <a:cs typeface="David" pitchFamily="34" charset="-79"/>
+              </a:rPr>
+              <a:t> על </a:t>
+            </a:r>
+            <a:r>
+              <a:rPr lang="he-IL" sz="2800" b="1" dirty="0" smtClean="0">
+                <a:solidFill>
                   <a:srgbClr val="FF0000"/>
                 </a:solidFill>
                 <a:latin typeface="David" pitchFamily="34" charset="-79"/>
                 <a:cs typeface="David" pitchFamily="34" charset="-79"/>
               </a:rPr>
-              <a:t>שלא מכבד </a:t>
+              <a:t>גפה</a:t>
+            </a:r>
+            <a:r>
+              <a:rPr lang="he-IL" sz="2800" b="1" dirty="0" smtClean="0">
+                <a:solidFill>
+                  <a:srgbClr val="FF0000"/>
+                </a:solidFill>
+                <a:latin typeface="David" pitchFamily="34" charset="-79"/>
+                <a:cs typeface="David" pitchFamily="34" charset="-79"/>
+              </a:rPr>
+              <a:t> </a:t>
             </a:r>
             <a:endParaRPr lang="he-IL" sz="2800" b="1" dirty="0">
               <a:solidFill>
@@ -5997,10 +5962,18 @@
             <a:r>
               <a:rPr lang="he-IL" sz="2800" b="1" dirty="0" smtClean="0">
                 <a:solidFill>
+                  <a:srgbClr val="00B050"/>
+                </a:solidFill>
+              </a:rPr>
+              <a:t>ח ס </a:t>
+            </a:r>
+            <a:r>
+              <a:rPr lang="he-IL" sz="2800" b="1" dirty="0" smtClean="0">
+                <a:solidFill>
                   <a:srgbClr val="FF0000"/>
                 </a:solidFill>
               </a:rPr>
-              <a:t>ב ז</a:t>
+              <a:t>י ד ה</a:t>
             </a:r>
             <a:endParaRPr lang="he-IL" sz="2800" b="1" dirty="0">
               <a:solidFill>
@@ -6098,7 +6071,7 @@
         </p:spPr>
         <p:txBody>
           <a:bodyPr>
-            <a:normAutofit fontScale="92500"/>
+            <a:normAutofit/>
           </a:bodyPr>
           <a:lstStyle/>
           <a:p>
@@ -6107,16 +6080,15 @@
             </a:pPr>
             <a:r>
               <a:rPr lang="he-IL" sz="6600" dirty="0" smtClean="0"/>
-              <a:t>טורף שהתפגר, או ציפור...</a:t>
-            </a:r>
-            <a:endParaRPr lang="he-IL" sz="6600" dirty="0"/>
+              <a:t>יוסת אחרת העונה</a:t>
+            </a:r>
           </a:p>
           <a:p>
             <a:pPr algn="ctr">
               <a:buNone/>
             </a:pPr>
             <a:r>
-              <a:rPr lang="he-IL" sz="8000" dirty="0">
+              <a:rPr lang="he-IL" sz="8000" dirty="0" smtClean="0">
                 <a:solidFill>
                   <a:schemeClr val="accent6">
                     <a:lumMod val="75000"/>
@@ -6125,7 +6097,7 @@
                 <a:latin typeface="David" pitchFamily="34" charset="-79"/>
                 <a:cs typeface="David" pitchFamily="34" charset="-79"/>
               </a:rPr>
-              <a:t>( _ </a:t>
+              <a:t>( </a:t>
             </a:r>
             <a:r>
               <a:rPr lang="he-IL" sz="8000" dirty="0" smtClean="0">
@@ -6137,10 +6109,10 @@
                 <a:latin typeface="David" pitchFamily="34" charset="-79"/>
                 <a:cs typeface="David" pitchFamily="34" charset="-79"/>
               </a:rPr>
-              <a:t>_ _ _ _ </a:t>
-            </a:r>
-            <a:r>
-              <a:rPr lang="he-IL" sz="8000" dirty="0">
+              <a:t>ס </a:t>
+            </a:r>
+            <a:r>
+              <a:rPr lang="he-IL" sz="8000" dirty="0" smtClean="0">
                 <a:solidFill>
                   <a:schemeClr val="accent6">
                     <a:lumMod val="75000"/>
@@ -6149,7 +6121,7 @@
                 <a:latin typeface="David" pitchFamily="34" charset="-79"/>
                 <a:cs typeface="David" pitchFamily="34" charset="-79"/>
               </a:rPr>
-              <a:t>)</a:t>
+              <a:t>_ _ _ )</a:t>
             </a:r>
           </a:p>
           <a:p>
@@ -6355,7 +6327,7 @@
                   <a:srgbClr val="0070C0"/>
                 </a:solidFill>
               </a:rPr>
-              <a:t>11</a:t>
+              <a:t>8</a:t>
             </a:r>
             <a:endParaRPr lang="he-IL" sz="2400" dirty="0">
               <a:solidFill>
@@ -6377,48 +6349,17 @@
             </a:pPr>
             <a:r>
               <a:rPr lang="he-IL" sz="2800" b="1" dirty="0" smtClean="0">
-                <a:solidFill>
-                  <a:srgbClr val="002060"/>
-                </a:solidFill>
-                <a:latin typeface="David" pitchFamily="34" charset="-79"/>
-                <a:cs typeface="David" pitchFamily="34" charset="-79"/>
-              </a:rPr>
-              <a:t>עוף </a:t>
-            </a:r>
-            <a:r>
-              <a:rPr lang="he-IL" sz="2800" b="1" dirty="0" smtClean="0">
-                <a:solidFill>
-                  <a:srgbClr val="FF0000"/>
-                </a:solidFill>
-                <a:latin typeface="David" pitchFamily="34" charset="-79"/>
-                <a:cs typeface="David" pitchFamily="34" charset="-79"/>
-              </a:rPr>
-              <a:t>שלא מכבד </a:t>
-            </a:r>
-            <a:endParaRPr lang="he-IL" sz="2800" b="1" dirty="0">
+                <a:latin typeface="David" pitchFamily="34" charset="-79"/>
+                <a:cs typeface="David" pitchFamily="34" charset="-79"/>
+              </a:rPr>
+              <a:t>בשולחן הניווט בכיף בסוף המסלול...</a:t>
+            </a:r>
+            <a:endParaRPr lang="he-IL" sz="2800" b="1" dirty="0" smtClean="0">
               <a:solidFill>
                 <a:srgbClr val="FF0000"/>
               </a:solidFill>
               <a:latin typeface="David" pitchFamily="34" charset="-79"/>
               <a:cs typeface="David" pitchFamily="34" charset="-79"/>
-            </a:endParaRPr>
-          </a:p>
-          <a:p>
-            <a:pPr algn="ctr">
-              <a:buNone/>
-            </a:pPr>
-            <a:r>
-              <a:rPr lang="he-IL" sz="2800" b="1" dirty="0" smtClean="0">
-                <a:solidFill>
-                  <a:srgbClr val="FF0000"/>
-                </a:solidFill>
-              </a:rPr>
-              <a:t>ב ז</a:t>
-            </a:r>
-            <a:endParaRPr lang="he-IL" sz="2800" b="1" dirty="0">
-              <a:solidFill>
-                <a:srgbClr val="FF0000"/>
-              </a:solidFill>
             </a:endParaRPr>
           </a:p>
         </p:txBody>
@@ -6483,7 +6424,7 @@
         <p:spPr/>
         <p:txBody>
           <a:bodyPr>
-            <a:normAutofit fontScale="70000" lnSpcReduction="20000"/>
+            <a:normAutofit fontScale="92500" lnSpcReduction="20000"/>
           </a:bodyPr>
           <a:lstStyle/>
           <a:p>
@@ -6492,135 +6433,91 @@
             </a:pPr>
             <a:r>
               <a:rPr lang="he-IL" dirty="0" smtClean="0"/>
-              <a:t>דוגמה: ביצה - </a:t>
+              <a:t>דוגמה:  סתוונית - סימן במוסלמית פורחת בסתיו</a:t>
+            </a:r>
+          </a:p>
+          <a:p>
+            <a:pPr>
+              <a:buNone/>
+            </a:pPr>
+            <a:r>
+              <a:rPr lang="he-IL" dirty="0" smtClean="0"/>
+              <a:t>1.  כרכום - פרח </a:t>
             </a:r>
             <a:r>
               <a:rPr lang="he-IL" dirty="0" err="1" smtClean="0"/>
-              <a:t>צביה</a:t>
+              <a:t>סתיווי</a:t>
             </a:r>
             <a:r>
               <a:rPr lang="he-IL" dirty="0" smtClean="0"/>
-              <a:t> התבלבלה: אני לפני, או אחרי התרנגולת?</a:t>
-            </a:r>
-          </a:p>
-          <a:p>
-            <a:pPr marL="514350" indent="-514350">
-              <a:buFont typeface="+mj-lt"/>
-              <a:buAutoNum type="arabicPeriod"/>
+              <a:t> מרוכך ומבולבל</a:t>
+            </a:r>
+          </a:p>
+          <a:p>
+            <a:pPr>
+              <a:buNone/>
             </a:pPr>
             <a:r>
               <a:rPr lang="he-IL" dirty="0" smtClean="0"/>
-              <a:t>גוזל - גונב בגיל צעיר</a:t>
-            </a:r>
-          </a:p>
-          <a:p>
-            <a:pPr marL="514350" indent="-514350">
-              <a:buFont typeface="+mj-lt"/>
-              <a:buAutoNum type="arabicPeriod"/>
+              <a:t>2.  חצב - חפר פרח בסתיו</a:t>
+            </a:r>
+          </a:p>
+          <a:p>
+            <a:pPr>
+              <a:buNone/>
             </a:pPr>
             <a:r>
               <a:rPr lang="he-IL" dirty="0" smtClean="0"/>
-              <a:t>קן - בית החבר של ברבי</a:t>
-            </a:r>
-          </a:p>
-          <a:p>
-            <a:pPr marL="514350" indent="-514350">
-              <a:buFont typeface="+mj-lt"/>
-              <a:buAutoNum type="arabicPeriod"/>
+              <a:t>3.  יורה - ילמד משקע בסתיו</a:t>
+            </a:r>
+          </a:p>
+          <a:p>
+            <a:pPr>
+              <a:buNone/>
             </a:pPr>
             <a:r>
               <a:rPr lang="he-IL" dirty="0" smtClean="0"/>
-              <a:t>דרור - ציפור חופש</a:t>
-            </a:r>
-          </a:p>
-          <a:p>
-            <a:pPr marL="514350" indent="-514350">
-              <a:buFont typeface="+mj-lt"/>
-              <a:buAutoNum type="arabicPeriod"/>
+              <a:t>4.  תשרי - שירת בבלבול חודש</a:t>
+            </a:r>
+          </a:p>
+          <a:p>
+            <a:pPr>
+              <a:buNone/>
             </a:pPr>
             <a:r>
               <a:rPr lang="he-IL" dirty="0" smtClean="0"/>
-              <a:t>פרס - הדורס שאל: "אני לוזר"?</a:t>
-            </a:r>
-          </a:p>
-          <a:p>
-            <a:pPr marL="514350" indent="-514350">
-              <a:buFont typeface="+mj-lt"/>
-              <a:buAutoNum type="arabicPeriod"/>
+              <a:t>5.  נדידה - תופעה: כשל וצלע לכיוון דרום</a:t>
+            </a:r>
+          </a:p>
+          <a:p>
+            <a:pPr>
+              <a:buNone/>
             </a:pPr>
             <a:r>
               <a:rPr lang="he-IL" dirty="0" smtClean="0"/>
-              <a:t>טבלן - בטלן מבולבל מבלה באגם ובים</a:t>
-            </a:r>
-          </a:p>
-          <a:p>
-            <a:pPr marL="514350" indent="-514350">
-              <a:buFont typeface="+mj-lt"/>
-              <a:buAutoNum type="arabicPeriod"/>
+              <a:t>6.  שלכת - נשירה בבעלות קבוצה</a:t>
+            </a:r>
+          </a:p>
+          <a:p>
+            <a:pPr>
+              <a:buNone/>
             </a:pPr>
             <a:r>
               <a:rPr lang="he-IL" dirty="0" smtClean="0"/>
-              <a:t>שחרור - עוף בתום השרות</a:t>
-            </a:r>
-          </a:p>
-          <a:p>
-            <a:pPr marL="514350" indent="-514350">
-              <a:buFont typeface="+mj-lt"/>
-              <a:buAutoNum type="arabicPeriod"/>
+              <a:t>7.  חסידה - עוף נודד מרחם על גפה</a:t>
+            </a:r>
+          </a:p>
+          <a:p>
+            <a:pPr>
+              <a:buNone/>
             </a:pPr>
             <a:r>
               <a:rPr lang="he-IL" dirty="0" smtClean="0"/>
-              <a:t>יונה - וינה, או הנוי? בלבול של סמל השלום</a:t>
-            </a:r>
-          </a:p>
-          <a:p>
-            <a:pPr marL="514350" indent="-514350">
-              <a:buFont typeface="+mj-lt"/>
-              <a:buAutoNum type="arabicPeriod"/>
-            </a:pPr>
-            <a:r>
-              <a:rPr lang="he-IL" dirty="0" smtClean="0"/>
-              <a:t>עורב - הציפור שמה עין ומנהיג דתי</a:t>
-            </a:r>
-          </a:p>
-          <a:p>
-            <a:pPr marL="514350" indent="-514350">
-              <a:buFont typeface="+mj-lt"/>
-              <a:buAutoNum type="arabicPeriod"/>
-            </a:pPr>
-            <a:r>
-              <a:rPr lang="he-IL" dirty="0" smtClean="0"/>
-              <a:t>סבכי - שחור-כיפה שאף פעם לא מזיל דמעה</a:t>
-            </a:r>
-          </a:p>
-          <a:p>
-            <a:pPr marL="514350" indent="-514350">
-              <a:buFont typeface="+mj-lt"/>
-              <a:buAutoNum type="arabicPeriod"/>
-            </a:pPr>
-            <a:r>
-              <a:rPr lang="he-IL" dirty="0" smtClean="0"/>
-              <a:t>נשר - עוף שלא התמיד</a:t>
-            </a:r>
-          </a:p>
-          <a:p>
-            <a:pPr marL="514350" indent="-514350">
-              <a:buFont typeface="+mj-lt"/>
-              <a:buAutoNum type="arabicPeriod"/>
-            </a:pPr>
-            <a:r>
-              <a:rPr lang="he-IL" dirty="0" smtClean="0"/>
-              <a:t>בז - עוף שלא מכבד</a:t>
-            </a:r>
-          </a:p>
-          <a:p>
-            <a:pPr marL="514350" indent="-514350">
-              <a:buFont typeface="+mj-lt"/>
-              <a:buAutoNum type="arabicPeriod"/>
-            </a:pPr>
-            <a:r>
-              <a:rPr lang="he-IL" dirty="0" smtClean="0"/>
-              <a:t>תנשמת - טורף שהתפגר, או ציפור...</a:t>
+              <a:t>8.  </a:t>
+            </a:r>
+            <a:r>
+              <a:rPr lang="he-IL" smtClean="0"/>
+              <a:t>סתיו - יוסת אחרת העונה</a:t>
             </a:r>
             <a:endParaRPr lang="he-IL" dirty="0"/>
           </a:p>
@@ -6706,15 +6603,7 @@
             </a:pPr>
             <a:r>
               <a:rPr lang="he-IL" sz="6600" dirty="0" smtClean="0"/>
-              <a:t>פרח </a:t>
-            </a:r>
-            <a:r>
-              <a:rPr lang="he-IL" sz="6600" dirty="0" smtClean="0"/>
-              <a:t>סתווי </a:t>
-            </a:r>
-            <a:r>
-              <a:rPr lang="he-IL" sz="6600" dirty="0" smtClean="0"/>
-              <a:t>מרוכך ומבולבל</a:t>
+              <a:t>פרח סתווי מרוכך ומבולבל</a:t>
             </a:r>
             <a:endParaRPr lang="he-IL" sz="6600" dirty="0"/>
           </a:p>
@@ -6744,31 +6633,7 @@
                 <a:latin typeface="David" pitchFamily="34" charset="-79"/>
                 <a:cs typeface="David" pitchFamily="34" charset="-79"/>
               </a:rPr>
-              <a:t>_ </a:t>
-            </a:r>
-            <a:r>
-              <a:rPr lang="he-IL" sz="8000" dirty="0" smtClean="0">
-                <a:solidFill>
-                  <a:schemeClr val="accent6">
-                    <a:lumMod val="75000"/>
-                  </a:schemeClr>
-                </a:solidFill>
-                <a:latin typeface="David" pitchFamily="34" charset="-79"/>
-                <a:cs typeface="David" pitchFamily="34" charset="-79"/>
-              </a:rPr>
-              <a:t>_ _ </a:t>
-            </a:r>
-            <a:r>
-              <a:rPr lang="he-IL" sz="8000" dirty="0" smtClean="0">
-                <a:solidFill>
-                  <a:schemeClr val="accent6">
-                    <a:lumMod val="75000"/>
-                  </a:schemeClr>
-                </a:solidFill>
-                <a:latin typeface="David" pitchFamily="34" charset="-79"/>
-                <a:cs typeface="David" pitchFamily="34" charset="-79"/>
-              </a:rPr>
-              <a:t>_ </a:t>
+              <a:t>_ _ _ _ </a:t>
             </a:r>
             <a:r>
               <a:rPr lang="he-IL" sz="8000" dirty="0">
@@ -7150,11 +7015,7 @@
             </a:pPr>
             <a:r>
               <a:rPr lang="he-IL" sz="6600" dirty="0" smtClean="0"/>
-              <a:t>חפר פרח </a:t>
-            </a:r>
-            <a:r>
-              <a:rPr lang="he-IL" sz="6600" dirty="0" smtClean="0"/>
-              <a:t>בסתיו</a:t>
+              <a:t>חפר פרח בסתיו</a:t>
             </a:r>
           </a:p>
           <a:p>
@@ -7171,31 +7032,7 @@
                 <a:latin typeface="David" pitchFamily="34" charset="-79"/>
                 <a:cs typeface="David" pitchFamily="34" charset="-79"/>
               </a:rPr>
-              <a:t>( _ </a:t>
-            </a:r>
-            <a:r>
-              <a:rPr lang="he-IL" sz="8000" dirty="0" smtClean="0">
-                <a:solidFill>
-                  <a:schemeClr val="accent6">
-                    <a:lumMod val="75000"/>
-                  </a:schemeClr>
-                </a:solidFill>
-                <a:latin typeface="David" pitchFamily="34" charset="-79"/>
-                <a:cs typeface="David" pitchFamily="34" charset="-79"/>
-              </a:rPr>
-              <a:t>_ </a:t>
-            </a:r>
-            <a:r>
-              <a:rPr lang="he-IL" sz="8000" dirty="0" smtClean="0">
-                <a:solidFill>
-                  <a:schemeClr val="accent6">
-                    <a:lumMod val="75000"/>
-                  </a:schemeClr>
-                </a:solidFill>
-                <a:latin typeface="David" pitchFamily="34" charset="-79"/>
-                <a:cs typeface="David" pitchFamily="34" charset="-79"/>
-              </a:rPr>
-              <a:t>_ </a:t>
+              <a:t>( _ _ _ </a:t>
             </a:r>
             <a:r>
               <a:rPr lang="he-IL" sz="8000" dirty="0">
@@ -7423,75 +7260,54 @@
                 <a:latin typeface="David" pitchFamily="34" charset="-79"/>
                 <a:cs typeface="David" pitchFamily="34" charset="-79"/>
               </a:rPr>
-              <a:t>פרח </a:t>
+              <a:t>פרח סתווי מ</a:t>
             </a:r>
             <a:r>
               <a:rPr lang="he-IL" sz="2800" b="1" dirty="0" smtClean="0">
-                <a:latin typeface="David" pitchFamily="34" charset="-79"/>
-                <a:cs typeface="David" pitchFamily="34" charset="-79"/>
-              </a:rPr>
-              <a:t>סתווי </a:t>
+                <a:solidFill>
+                  <a:srgbClr val="0070C0"/>
+                </a:solidFill>
+                <a:latin typeface="David" pitchFamily="34" charset="-79"/>
+                <a:cs typeface="David" pitchFamily="34" charset="-79"/>
+              </a:rPr>
+              <a:t>ר</a:t>
             </a:r>
             <a:r>
               <a:rPr lang="he-IL" sz="2800" b="1" dirty="0" smtClean="0">
-                <a:latin typeface="David" pitchFamily="34" charset="-79"/>
-                <a:cs typeface="David" pitchFamily="34" charset="-79"/>
-              </a:rPr>
-              <a:t>מ</a:t>
+                <a:solidFill>
+                  <a:srgbClr val="00B050"/>
+                </a:solidFill>
+                <a:latin typeface="David" pitchFamily="34" charset="-79"/>
+                <a:cs typeface="David" pitchFamily="34" charset="-79"/>
+              </a:rPr>
+              <a:t>ו</a:t>
             </a:r>
             <a:r>
               <a:rPr lang="he-IL" sz="2800" b="1" dirty="0" smtClean="0">
                 <a:solidFill>
-                  <a:srgbClr val="0070C0"/>
-                </a:solidFill>
-                <a:latin typeface="David" pitchFamily="34" charset="-79"/>
-                <a:cs typeface="David" pitchFamily="34" charset="-79"/>
-              </a:rPr>
-              <a:t>ר</a:t>
+                  <a:srgbClr val="FF0000"/>
+                </a:solidFill>
+                <a:latin typeface="David" pitchFamily="34" charset="-79"/>
+                <a:cs typeface="David" pitchFamily="34" charset="-79"/>
+              </a:rPr>
+              <a:t>כ</a:t>
             </a:r>
             <a:r>
               <a:rPr lang="he-IL" sz="2800" b="1" dirty="0" smtClean="0">
                 <a:solidFill>
-                  <a:srgbClr val="00B050"/>
-                </a:solidFill>
-                <a:latin typeface="David" pitchFamily="34" charset="-79"/>
-                <a:cs typeface="David" pitchFamily="34" charset="-79"/>
-              </a:rPr>
-              <a:t>ו</a:t>
+                  <a:srgbClr val="7030A0"/>
+                </a:solidFill>
+                <a:latin typeface="David" pitchFamily="34" charset="-79"/>
+                <a:cs typeface="David" pitchFamily="34" charset="-79"/>
+              </a:rPr>
+              <a:t>ך</a:t>
             </a:r>
             <a:r>
               <a:rPr lang="he-IL" sz="2800" b="1" dirty="0" smtClean="0">
-                <a:solidFill>
-                  <a:srgbClr val="FF0000"/>
-                </a:solidFill>
-                <a:latin typeface="David" pitchFamily="34" charset="-79"/>
-                <a:cs typeface="David" pitchFamily="34" charset="-79"/>
-              </a:rPr>
-              <a:t>כ</a:t>
-            </a:r>
-            <a:r>
-              <a:rPr lang="he-IL" sz="2800" b="1" dirty="0" smtClean="0">
-                <a:solidFill>
-                  <a:srgbClr val="7030A0"/>
-                </a:solidFill>
-                <a:latin typeface="David" pitchFamily="34" charset="-79"/>
-                <a:cs typeface="David" pitchFamily="34" charset="-79"/>
-              </a:rPr>
-              <a:t>ך</a:t>
-            </a:r>
-            <a:r>
-              <a:rPr lang="he-IL" sz="2800" b="1" dirty="0" smtClean="0">
-                <a:latin typeface="David" pitchFamily="34" charset="-79"/>
-                <a:cs typeface="David" pitchFamily="34" charset="-79"/>
-              </a:rPr>
-              <a:t> </a:t>
-            </a:r>
-            <a:r>
-              <a:rPr lang="he-IL" sz="2800" b="1" dirty="0" smtClean="0">
-                <a:latin typeface="David" pitchFamily="34" charset="-79"/>
-                <a:cs typeface="David" pitchFamily="34" charset="-79"/>
-              </a:rPr>
-              <a:t>ומבולבל</a:t>
+                <a:latin typeface="David" pitchFamily="34" charset="-79"/>
+                <a:cs typeface="David" pitchFamily="34" charset="-79"/>
+              </a:rPr>
+              <a:t> ומבולבל</a:t>
             </a:r>
           </a:p>
           <a:p>
@@ -7658,7 +7474,31 @@
                 <a:latin typeface="David" pitchFamily="34" charset="-79"/>
                 <a:cs typeface="David" pitchFamily="34" charset="-79"/>
               </a:rPr>
-              <a:t>( _ _ </a:t>
+              <a:t>( </a:t>
+            </a:r>
+            <a:r>
+              <a:rPr lang="he-IL" sz="8000" dirty="0" smtClean="0">
+                <a:solidFill>
+                  <a:schemeClr val="accent6">
+                    <a:lumMod val="75000"/>
+                  </a:schemeClr>
+                </a:solidFill>
+                <a:latin typeface="David" pitchFamily="34" charset="-79"/>
+                <a:cs typeface="David" pitchFamily="34" charset="-79"/>
+              </a:rPr>
+              <a:t>ח </a:t>
+            </a:r>
+            <a:r>
+              <a:rPr lang="he-IL" sz="8000" dirty="0">
+                <a:solidFill>
+                  <a:schemeClr val="accent6">
+                    <a:lumMod val="75000"/>
+                  </a:schemeClr>
+                </a:solidFill>
+                <a:latin typeface="David" pitchFamily="34" charset="-79"/>
+                <a:cs typeface="David" pitchFamily="34" charset="-79"/>
+              </a:rPr>
+              <a:t>_ </a:t>
             </a:r>
             <a:r>
               <a:rPr lang="he-IL" sz="8000" dirty="0" smtClean="0">
@@ -8002,7 +7842,11 @@
             </a:pPr>
             <a:r>
               <a:rPr lang="he-IL" sz="6600" dirty="0" smtClean="0"/>
-              <a:t>הדורס שאל: "אני לוזר"?</a:t>
+              <a:t>ילמד משקע </a:t>
+            </a:r>
+            <a:r>
+              <a:rPr lang="he-IL" sz="6600" dirty="0" smtClean="0"/>
+              <a:t>בסתיו</a:t>
             </a:r>
           </a:p>
           <a:p>
@@ -8019,10 +7863,10 @@
                 <a:latin typeface="David" pitchFamily="34" charset="-79"/>
                 <a:cs typeface="David" pitchFamily="34" charset="-79"/>
               </a:rPr>
-              <a:t>( _ _ </a:t>
-            </a:r>
-            <a:r>
-              <a:rPr lang="he-IL" sz="8000" dirty="0">
+              <a:t>( </a:t>
+            </a:r>
+            <a:r>
+              <a:rPr lang="he-IL" sz="8000" dirty="0" smtClean="0">
                 <a:solidFill>
                   <a:schemeClr val="accent6">
                     <a:lumMod val="75000"/>
@@ -8031,7 +7875,43 @@
                 <a:latin typeface="David" pitchFamily="34" charset="-79"/>
                 <a:cs typeface="David" pitchFamily="34" charset="-79"/>
               </a:rPr>
-              <a:t>_ )</a:t>
+              <a:t>_ </a:t>
+            </a:r>
+            <a:r>
+              <a:rPr lang="he-IL" sz="8000" dirty="0" smtClean="0">
+                <a:solidFill>
+                  <a:schemeClr val="accent6">
+                    <a:lumMod val="75000"/>
+                  </a:schemeClr>
+                </a:solidFill>
+                <a:latin typeface="David" pitchFamily="34" charset="-79"/>
+                <a:cs typeface="David" pitchFamily="34" charset="-79"/>
+              </a:rPr>
+              <a:t>_ _ </a:t>
+            </a:r>
+            <a:r>
+              <a:rPr lang="he-IL" sz="8000" dirty="0" smtClean="0">
+                <a:solidFill>
+                  <a:schemeClr val="accent6">
+                    <a:lumMod val="75000"/>
+                  </a:schemeClr>
+                </a:solidFill>
+                <a:latin typeface="David" pitchFamily="34" charset="-79"/>
+                <a:cs typeface="David" pitchFamily="34" charset="-79"/>
+              </a:rPr>
+              <a:t>_ </a:t>
+            </a:r>
+            <a:r>
+              <a:rPr lang="he-IL" sz="8000" dirty="0">
+                <a:solidFill>
+                  <a:schemeClr val="accent6">
+                    <a:lumMod val="75000"/>
+                  </a:schemeClr>
+                </a:solidFill>
+                <a:latin typeface="David" pitchFamily="34" charset="-79"/>
+                <a:cs typeface="David" pitchFamily="34" charset="-79"/>
+              </a:rPr>
+              <a:t>)</a:t>
             </a:r>
           </a:p>
           <a:p>
@@ -8229,8 +8109,21 @@
                   <a:srgbClr val="0070C0"/>
                 </a:solidFill>
               </a:rPr>
-              <a:t>פתרון חידה 3</a:t>
-            </a:r>
+              <a:t>פתרון חידה </a:t>
+            </a:r>
+            <a:r>
+              <a:rPr lang="he-IL" sz="2400" dirty="0" smtClean="0">
+                <a:solidFill>
+                  <a:srgbClr val="0070C0"/>
+                </a:solidFill>
+              </a:rPr>
+              <a:t>2</a:t>
+            </a:r>
+            <a:endParaRPr lang="he-IL" sz="2400" dirty="0">
+              <a:solidFill>
+                <a:srgbClr val="0070C0"/>
+              </a:solidFill>
+            </a:endParaRPr>
           </a:p>
           <a:p>
             <a:pPr algn="ctr"/>
@@ -8246,35 +8139,42 @@
             </a:pPr>
             <a:r>
               <a:rPr lang="he-IL" sz="2800" b="1" dirty="0" smtClean="0">
-                <a:latin typeface="David" pitchFamily="34" charset="-79"/>
-                <a:cs typeface="David" pitchFamily="34" charset="-79"/>
-              </a:rPr>
-              <a:t>ציפור </a:t>
+                <a:solidFill>
+                  <a:srgbClr val="FF0000"/>
+                </a:solidFill>
+                <a:latin typeface="David" pitchFamily="34" charset="-79"/>
+                <a:cs typeface="David" pitchFamily="34" charset="-79"/>
+              </a:rPr>
+              <a:t>חפר</a:t>
             </a:r>
             <a:r>
               <a:rPr lang="he-IL" sz="2800" b="1" dirty="0" smtClean="0">
+                <a:latin typeface="David" pitchFamily="34" charset="-79"/>
+                <a:cs typeface="David" pitchFamily="34" charset="-79"/>
+              </a:rPr>
+              <a:t> פרח בסתיו</a:t>
+            </a:r>
+            <a:endParaRPr lang="he-IL" sz="2800" b="1" dirty="0" smtClean="0">
+              <a:solidFill>
+                <a:srgbClr val="FF0000"/>
+              </a:solidFill>
+              <a:latin typeface="David" pitchFamily="34" charset="-79"/>
+              <a:cs typeface="David" pitchFamily="34" charset="-79"/>
+            </a:endParaRPr>
+          </a:p>
+          <a:p>
+            <a:pPr algn="ctr">
+              <a:buNone/>
+            </a:pPr>
+            <a:r>
+              <a:rPr lang="he-IL" sz="2800" b="1" dirty="0" smtClean="0">
                 <a:solidFill>
                   <a:srgbClr val="FF0000"/>
                 </a:solidFill>
                 <a:latin typeface="David" pitchFamily="34" charset="-79"/>
                 <a:cs typeface="David" pitchFamily="34" charset="-79"/>
               </a:rPr>
-              <a:t>חופש</a:t>
-            </a:r>
-          </a:p>
-          <a:p>
-            <a:pPr algn="ctr">
-              <a:buNone/>
-            </a:pPr>
-            <a:r>
-              <a:rPr lang="he-IL" sz="2800" b="1" dirty="0" smtClean="0">
-                <a:solidFill>
-                  <a:srgbClr val="FF0000"/>
-                </a:solidFill>
-                <a:latin typeface="David" pitchFamily="34" charset="-79"/>
-                <a:cs typeface="David" pitchFamily="34" charset="-79"/>
-              </a:rPr>
-              <a:t>ד ר ו ר</a:t>
+              <a:t>ח צ ב</a:t>
             </a:r>
             <a:endParaRPr lang="he-IL" sz="2800" b="1" dirty="0">
               <a:solidFill>
@@ -8357,7 +8257,7 @@
         </p:spPr>
         <p:txBody>
           <a:bodyPr>
-            <a:normAutofit fontScale="85000" lnSpcReduction="20000"/>
+            <a:normAutofit/>
           </a:bodyPr>
           <a:lstStyle/>
           <a:p>
@@ -8366,7 +8266,7 @@
             </a:pPr>
             <a:r>
               <a:rPr lang="he-IL" sz="6600" dirty="0" smtClean="0"/>
-              <a:t>בטלן מבולבל מבלה באגם ובים</a:t>
+              <a:t>ילמד משקע בסתיו</a:t>
             </a:r>
           </a:p>
           <a:p>
@@ -8383,7 +8283,7 @@
                 <a:latin typeface="David" pitchFamily="34" charset="-79"/>
                 <a:cs typeface="David" pitchFamily="34" charset="-79"/>
               </a:rPr>
-              <a:t>( </a:t>
+              <a:t>( י </a:t>
             </a:r>
             <a:r>
               <a:rPr lang="he-IL" sz="8000" dirty="0">
@@ -8395,7 +8295,7 @@
                 <a:latin typeface="David" pitchFamily="34" charset="-79"/>
                 <a:cs typeface="David" pitchFamily="34" charset="-79"/>
               </a:rPr>
-              <a:t>_ _ </a:t>
+              <a:t>_ </a:t>
             </a:r>
             <a:r>
               <a:rPr lang="he-IL" sz="8000" dirty="0" smtClean="0">
@@ -8625,7 +8525,7 @@
                   <a:srgbClr val="0070C0"/>
                 </a:solidFill>
               </a:rPr>
-              <a:t>2</a:t>
+              <a:t>3</a:t>
             </a:r>
             <a:endParaRPr lang="he-IL" sz="2400" dirty="0">
               <a:solidFill>
@@ -8752,7 +8652,7 @@
             </a:pPr>
             <a:r>
               <a:rPr lang="he-IL" sz="6600" dirty="0" smtClean="0"/>
-              <a:t>עוף בתום השרות</a:t>
+              <a:t>שירת בבלבול חודש</a:t>
             </a:r>
             <a:endParaRPr lang="he-IL" sz="6600" dirty="0"/>
           </a:p>
@@ -8770,7 +8670,7 @@
                 <a:latin typeface="David" pitchFamily="34" charset="-79"/>
                 <a:cs typeface="David" pitchFamily="34" charset="-79"/>
               </a:rPr>
-              <a:t>( _ _ </a:t>
+              <a:t>( _ </a:t>
             </a:r>
             <a:r>
               <a:rPr lang="he-IL" sz="8000" dirty="0" smtClean="0">
@@ -8782,7 +8682,19 @@
                 <a:latin typeface="David" pitchFamily="34" charset="-79"/>
                 <a:cs typeface="David" pitchFamily="34" charset="-79"/>
               </a:rPr>
-              <a:t>_ _ </a:t>
+              <a:t>_ </a:t>
+            </a:r>
+            <a:r>
+              <a:rPr lang="he-IL" sz="8000" dirty="0" smtClean="0">
+                <a:solidFill>
+                  <a:schemeClr val="accent6">
+                    <a:lumMod val="75000"/>
+                  </a:schemeClr>
+                </a:solidFill>
+                <a:latin typeface="David" pitchFamily="34" charset="-79"/>
+                <a:cs typeface="David" pitchFamily="34" charset="-79"/>
+              </a:rPr>
+              <a:t>_ </a:t>
             </a:r>
             <a:r>
               <a:rPr lang="he-IL" sz="8000" dirty="0">
@@ -8973,7 +8885,7 @@
         <p:spPr>
           <a:xfrm>
             <a:off x="609600" y="4495800"/>
-            <a:ext cx="3352800" cy="2123658"/>
+            <a:ext cx="3352800" cy="1692771"/>
           </a:xfrm>
           <a:prstGeom prst="rect">
             <a:avLst/>
@@ -8992,8 +8904,21 @@
                   <a:srgbClr val="0070C0"/>
                 </a:solidFill>
               </a:rPr>
-              <a:t>פתרון חידה 5</a:t>
-            </a:r>
+              <a:t>פתרון חידה </a:t>
+            </a:r>
+            <a:r>
+              <a:rPr lang="he-IL" sz="2400" dirty="0" smtClean="0">
+                <a:solidFill>
+                  <a:srgbClr val="0070C0"/>
+                </a:solidFill>
+              </a:rPr>
+              <a:t>3</a:t>
+            </a:r>
+            <a:endParaRPr lang="he-IL" sz="2400" dirty="0">
+              <a:solidFill>
+                <a:srgbClr val="0070C0"/>
+              </a:solidFill>
+            </a:endParaRPr>
           </a:p>
           <a:p>
             <a:pPr algn="ctr"/>
@@ -9009,95 +8934,33 @@
             </a:pPr>
             <a:r>
               <a:rPr lang="he-IL" sz="2800" b="1" dirty="0" smtClean="0">
-                <a:latin typeface="David" pitchFamily="34" charset="-79"/>
-                <a:cs typeface="David" pitchFamily="34" charset="-79"/>
-              </a:rPr>
-              <a:t>ב</a:t>
+                <a:solidFill>
+                  <a:srgbClr val="FF0000"/>
+                </a:solidFill>
+                <a:latin typeface="David" pitchFamily="34" charset="-79"/>
+                <a:cs typeface="David" pitchFamily="34" charset="-79"/>
+              </a:rPr>
+              <a:t>ילמד</a:t>
             </a:r>
             <a:r>
               <a:rPr lang="he-IL" sz="2800" b="1" dirty="0" smtClean="0">
+                <a:latin typeface="David" pitchFamily="34" charset="-79"/>
+                <a:cs typeface="David" pitchFamily="34" charset="-79"/>
+              </a:rPr>
+              <a:t> משקע בסתיו</a:t>
+            </a:r>
+          </a:p>
+          <a:p>
+            <a:pPr algn="ctr">
+              <a:buNone/>
+            </a:pPr>
+            <a:r>
+              <a:rPr lang="he-IL" sz="2800" b="1" dirty="0" smtClean="0">
                 <a:solidFill>
                   <a:srgbClr val="FF0000"/>
                 </a:solidFill>
-                <a:latin typeface="David" pitchFamily="34" charset="-79"/>
-                <a:cs typeface="David" pitchFamily="34" charset="-79"/>
-              </a:rPr>
-              <a:t>ט</a:t>
-            </a:r>
-            <a:r>
-              <a:rPr lang="he-IL" sz="2800" b="1" dirty="0" smtClean="0">
-                <a:solidFill>
-                  <a:srgbClr val="00B050"/>
-                </a:solidFill>
-                <a:latin typeface="David" pitchFamily="34" charset="-79"/>
-                <a:cs typeface="David" pitchFamily="34" charset="-79"/>
-              </a:rPr>
-              <a:t>ל</a:t>
-            </a:r>
-            <a:r>
-              <a:rPr lang="he-IL" sz="2800" b="1" dirty="0" smtClean="0">
-                <a:solidFill>
-                  <a:srgbClr val="0070C0"/>
-                </a:solidFill>
-                <a:latin typeface="David" pitchFamily="34" charset="-79"/>
-                <a:cs typeface="David" pitchFamily="34" charset="-79"/>
-              </a:rPr>
-              <a:t>ן</a:t>
-            </a:r>
-            <a:r>
-              <a:rPr lang="he-IL" sz="2800" b="1" dirty="0" smtClean="0">
-                <a:latin typeface="David" pitchFamily="34" charset="-79"/>
-                <a:cs typeface="David" pitchFamily="34" charset="-79"/>
-              </a:rPr>
-              <a:t> מבולבל מבלה באגם ובים</a:t>
-            </a:r>
-            <a:endParaRPr lang="he-IL" sz="2800" b="1" dirty="0" smtClean="0">
-              <a:solidFill>
-                <a:srgbClr val="FF0000"/>
-              </a:solidFill>
-              <a:latin typeface="David" pitchFamily="34" charset="-79"/>
-              <a:cs typeface="David" pitchFamily="34" charset="-79"/>
-            </a:endParaRPr>
-          </a:p>
-          <a:p>
-            <a:pPr algn="ctr">
-              <a:buNone/>
-            </a:pPr>
-            <a:r>
-              <a:rPr lang="he-IL" sz="2800" b="1" dirty="0" smtClean="0">
-                <a:solidFill>
-                  <a:srgbClr val="FF0000"/>
-                </a:solidFill>
-              </a:rPr>
-              <a:t>ט</a:t>
-            </a:r>
-            <a:r>
-              <a:rPr lang="he-IL" sz="2800" b="1" dirty="0" smtClean="0">
-                <a:solidFill>
-                  <a:srgbClr val="00B050"/>
-                </a:solidFill>
-              </a:rPr>
-              <a:t> </a:t>
-            </a:r>
-            <a:r>
-              <a:rPr lang="he-IL" sz="2800" b="1" dirty="0" smtClean="0"/>
-              <a:t>ב</a:t>
-            </a:r>
-            <a:r>
-              <a:rPr lang="he-IL" sz="2800" b="1" dirty="0" smtClean="0">
-                <a:solidFill>
-                  <a:srgbClr val="00B050"/>
-                </a:solidFill>
-              </a:rPr>
-              <a:t> ל </a:t>
-            </a:r>
-            <a:r>
-              <a:rPr lang="he-IL" sz="2800" b="1" dirty="0" smtClean="0">
-                <a:solidFill>
-                  <a:srgbClr val="0070C0"/>
-                </a:solidFill>
-              </a:rPr>
-              <a:t>ן</a:t>
+              </a:rPr>
+              <a:t>י ו ר ה</a:t>
             </a:r>
             <a:endParaRPr lang="he-IL" sz="2800" b="1" dirty="0">
               <a:solidFill>
@@ -9178,7 +9041,7 @@
         </p:spPr>
         <p:txBody>
           <a:bodyPr>
-            <a:normAutofit fontScale="85000" lnSpcReduction="20000"/>
+            <a:normAutofit/>
           </a:bodyPr>
           <a:lstStyle/>
           <a:p>
@@ -9187,7 +9050,7 @@
             </a:pPr>
             <a:r>
               <a:rPr lang="he-IL" sz="6600" dirty="0" smtClean="0"/>
-              <a:t>וינה, או הנוי? בלבול של סמל השלום</a:t>
+              <a:t>שירת בבלבול חודש</a:t>
             </a:r>
             <a:endParaRPr lang="he-IL" sz="6600" dirty="0"/>
           </a:p>
@@ -9205,7 +9068,19 @@
                 <a:latin typeface="David" pitchFamily="34" charset="-79"/>
                 <a:cs typeface="David" pitchFamily="34" charset="-79"/>
               </a:rPr>
-              <a:t>( _ _ </a:t>
+              <a:t>( </a:t>
+            </a:r>
+            <a:r>
+              <a:rPr lang="he-IL" sz="8000" dirty="0" smtClean="0">
+                <a:solidFill>
+                  <a:schemeClr val="accent6">
+                    <a:lumMod val="75000"/>
+                  </a:schemeClr>
+                </a:solidFill>
+                <a:latin typeface="David" pitchFamily="34" charset="-79"/>
+                <a:cs typeface="David" pitchFamily="34" charset="-79"/>
+              </a:rPr>
+              <a:t>ת _ </a:t>
             </a:r>
             <a:r>
               <a:rPr lang="he-IL" sz="8000" dirty="0" smtClean="0">
@@ -9408,7 +9283,7 @@
         <p:spPr>
           <a:xfrm>
             <a:off x="457200" y="4495800"/>
-            <a:ext cx="3657600" cy="1692771"/>
+            <a:ext cx="3657600" cy="1261884"/>
           </a:xfrm>
           <a:prstGeom prst="rect">
             <a:avLst/>
@@ -9422,23 +9297,36 @@
           <a:p>
             <a:pPr algn="ctr"/>
             <a:r>
-              <a:rPr lang="he-IL" sz="2400" dirty="0">
-                <a:solidFill>
-                  <a:srgbClr val="0070C0"/>
-                </a:solidFill>
-              </a:rPr>
-              <a:t>פתרון חידה 6</a:t>
-            </a:r>
-          </a:p>
-          <a:p>
-            <a:pPr algn="ctr"/>
-            <a:endParaRPr lang="he-IL" sz="2400" dirty="0">
+              <a:rPr lang="he-IL" sz="2400" dirty="0" smtClean="0">
+                <a:solidFill>
+                  <a:srgbClr val="0070C0"/>
+                </a:solidFill>
+              </a:rPr>
+              <a:t>פתרון חידה </a:t>
+            </a:r>
+            <a:r>
+              <a:rPr lang="he-IL" sz="2400" dirty="0" smtClean="0">
+                <a:solidFill>
+                  <a:srgbClr val="0070C0"/>
+                </a:solidFill>
+              </a:rPr>
+              <a:t>4</a:t>
+            </a:r>
+            <a:endParaRPr lang="he-IL" sz="2400" dirty="0" smtClean="0">
               <a:solidFill>
                 <a:srgbClr val="0070C0"/>
               </a:solidFill>
             </a:endParaRPr>
           </a:p>
           <a:p>
+            <a:pPr algn="ctr"/>
+            <a:endParaRPr lang="he-IL" sz="2400" dirty="0" smtClean="0">
+              <a:solidFill>
+                <a:srgbClr val="0070C0"/>
+              </a:solidFill>
+            </a:endParaRPr>
+          </a:p>
+          <a:p>
             <a:pPr algn="ctr">
               <a:buNone/>
             </a:pPr>
@@ -9447,25 +9335,14 @@
                 <a:latin typeface="David" pitchFamily="34" charset="-79"/>
                 <a:cs typeface="David" pitchFamily="34" charset="-79"/>
               </a:rPr>
-              <a:t>עוף בתום השרות </a:t>
-            </a:r>
-          </a:p>
-          <a:p>
-            <a:pPr algn="ctr">
-              <a:buNone/>
-            </a:pPr>
-            <a:r>
-              <a:rPr lang="he-IL" sz="2800" b="1" dirty="0" smtClean="0">
-                <a:solidFill>
-                  <a:srgbClr val="FF0000"/>
-                </a:solidFill>
-              </a:rPr>
-              <a:t>ש ח ר ו ר</a:t>
-            </a:r>
-            <a:endParaRPr lang="he-IL" sz="2800" b="1" dirty="0">
+              <a:t>בתחנה הבאה...</a:t>
+            </a:r>
+            <a:endParaRPr lang="he-IL" sz="2800" b="1" dirty="0" smtClean="0">
               <a:solidFill>
                 <a:srgbClr val="FF0000"/>
               </a:solidFill>
+              <a:latin typeface="David" pitchFamily="34" charset="-79"/>
+              <a:cs typeface="David" pitchFamily="34" charset="-79"/>
             </a:endParaRPr>
           </a:p>
         </p:txBody>
@@ -9550,7 +9427,7 @@
             </a:pPr>
             <a:r>
               <a:rPr lang="he-IL" sz="6600" dirty="0" smtClean="0"/>
-              <a:t>הציפור שמה עין ומנהיג דתי</a:t>
+              <a:t>תופעה: כשל וצלע לכיוון דרום</a:t>
             </a:r>
             <a:endParaRPr lang="he-IL" sz="6600" dirty="0"/>
           </a:p>
@@ -9568,7 +9445,19 @@
                 <a:latin typeface="David" pitchFamily="34" charset="-79"/>
                 <a:cs typeface="David" pitchFamily="34" charset="-79"/>
               </a:rPr>
-              <a:t>( _ _ </a:t>
+              <a:t>( _ </a:t>
+            </a:r>
+            <a:r>
+              <a:rPr lang="he-IL" sz="8000" dirty="0" smtClean="0">
+                <a:solidFill>
+                  <a:schemeClr val="accent6">
+                    <a:lumMod val="75000"/>
+                  </a:schemeClr>
+                </a:solidFill>
+                <a:latin typeface="David" pitchFamily="34" charset="-79"/>
+                <a:cs typeface="David" pitchFamily="34" charset="-79"/>
+              </a:rPr>
+              <a:t>_ _ </a:t>
             </a:r>
             <a:r>
               <a:rPr lang="he-IL" sz="8000" dirty="0" smtClean="0">
@@ -9771,7 +9660,7 @@
         <p:spPr>
           <a:xfrm>
             <a:off x="609600" y="4495800"/>
-            <a:ext cx="3352800" cy="2123658"/>
+            <a:ext cx="3352800" cy="1692771"/>
           </a:xfrm>
           <a:prstGeom prst="rect">
             <a:avLst/>
@@ -9790,8 +9679,21 @@
                   <a:srgbClr val="0070C0"/>
                 </a:solidFill>
               </a:rPr>
-              <a:t>פתרון חידה 7</a:t>
-            </a:r>
+              <a:t>פתרון חידה </a:t>
+            </a:r>
+            <a:r>
+              <a:rPr lang="he-IL" sz="2400" dirty="0" smtClean="0">
+                <a:solidFill>
+                  <a:srgbClr val="0070C0"/>
+                </a:solidFill>
+              </a:rPr>
+              <a:t>4</a:t>
+            </a:r>
+            <a:endParaRPr lang="he-IL" sz="2400" dirty="0">
+              <a:solidFill>
+                <a:srgbClr val="0070C0"/>
+              </a:solidFill>
+            </a:endParaRPr>
           </a:p>
           <a:p>
             <a:pPr algn="ctr"/>
@@ -9807,91 +9709,54 @@
             </a:pPr>
             <a:r>
               <a:rPr lang="he-IL" sz="2800" b="1" dirty="0" smtClean="0">
-                <a:solidFill>
-                  <a:srgbClr val="0070C0"/>
-                </a:solidFill>
-                <a:latin typeface="David" pitchFamily="34" charset="-79"/>
-                <a:cs typeface="David" pitchFamily="34" charset="-79"/>
-              </a:rPr>
-              <a:t>ו</a:t>
+                <a:latin typeface="David" pitchFamily="34" charset="-79"/>
+                <a:cs typeface="David" pitchFamily="34" charset="-79"/>
+              </a:rPr>
+              <a:t>ש</a:t>
             </a:r>
             <a:r>
               <a:rPr lang="he-IL" sz="2800" b="1" dirty="0" smtClean="0">
                 <a:solidFill>
+                  <a:srgbClr val="FF0000"/>
+                </a:solidFill>
+                <a:latin typeface="David" pitchFamily="34" charset="-79"/>
+                <a:cs typeface="David" pitchFamily="34" charset="-79"/>
+              </a:rPr>
+              <a:t>י</a:t>
+            </a:r>
+            <a:r>
+              <a:rPr lang="he-IL" sz="2800" b="1" dirty="0" smtClean="0">
+                <a:solidFill>
+                  <a:srgbClr val="0070C0"/>
+                </a:solidFill>
+                <a:latin typeface="David" pitchFamily="34" charset="-79"/>
+                <a:cs typeface="David" pitchFamily="34" charset="-79"/>
+              </a:rPr>
+              <a:t>ר</a:t>
+            </a:r>
+            <a:r>
+              <a:rPr lang="he-IL" sz="2800" b="1" dirty="0" smtClean="0">
+                <a:solidFill>
                   <a:srgbClr val="00B050"/>
                 </a:solidFill>
                 <a:latin typeface="David" pitchFamily="34" charset="-79"/>
                 <a:cs typeface="David" pitchFamily="34" charset="-79"/>
               </a:rPr>
-              <a:t>י</a:t>
+              <a:t>ת</a:t>
             </a:r>
             <a:r>
               <a:rPr lang="he-IL" sz="2800" b="1" dirty="0" smtClean="0">
                 <a:latin typeface="David" pitchFamily="34" charset="-79"/>
                 <a:cs typeface="David" pitchFamily="34" charset="-79"/>
               </a:rPr>
-              <a:t>נ</a:t>
+              <a:t> בבלבול חודש</a:t>
             </a:r>
             <a:r>
               <a:rPr lang="he-IL" sz="2800" b="1" dirty="0" smtClean="0">
-                <a:solidFill>
-                  <a:srgbClr val="FF0000"/>
-                </a:solidFill>
-                <a:latin typeface="David" pitchFamily="34" charset="-79"/>
-                <a:cs typeface="David" pitchFamily="34" charset="-79"/>
-              </a:rPr>
-              <a:t>ה</a:t>
-            </a:r>
-            <a:r>
-              <a:rPr lang="he-IL" sz="2800" b="1" dirty="0" smtClean="0">
-                <a:latin typeface="David" pitchFamily="34" charset="-79"/>
-                <a:cs typeface="David" pitchFamily="34" charset="-79"/>
-              </a:rPr>
-              <a:t>, או </a:t>
-            </a:r>
-            <a:r>
-              <a:rPr lang="he-IL" sz="2800" b="1" dirty="0" smtClean="0">
-                <a:solidFill>
-                  <a:srgbClr val="FF0000"/>
-                </a:solidFill>
-                <a:latin typeface="David" pitchFamily="34" charset="-79"/>
-                <a:cs typeface="David" pitchFamily="34" charset="-79"/>
-              </a:rPr>
-              <a:t>ה</a:t>
-            </a:r>
-            <a:r>
-              <a:rPr lang="he-IL" sz="2800" b="1" dirty="0" smtClean="0">
-                <a:latin typeface="David" pitchFamily="34" charset="-79"/>
-                <a:cs typeface="David" pitchFamily="34" charset="-79"/>
-              </a:rPr>
-              <a:t>נ</a:t>
-            </a:r>
-            <a:r>
-              <a:rPr lang="he-IL" sz="2800" b="1" dirty="0" smtClean="0">
-                <a:solidFill>
-                  <a:srgbClr val="0070C0"/>
-                </a:solidFill>
-                <a:latin typeface="David" pitchFamily="34" charset="-79"/>
-                <a:cs typeface="David" pitchFamily="34" charset="-79"/>
-              </a:rPr>
-              <a:t>ו</a:t>
-            </a:r>
-            <a:r>
-              <a:rPr lang="he-IL" sz="2800" b="1" dirty="0" smtClean="0">
-                <a:solidFill>
-                  <a:srgbClr val="00B050"/>
-                </a:solidFill>
-                <a:latin typeface="David" pitchFamily="34" charset="-79"/>
-                <a:cs typeface="David" pitchFamily="34" charset="-79"/>
-              </a:rPr>
-              <a:t>י</a:t>
-            </a:r>
-            <a:r>
-              <a:rPr lang="he-IL" sz="2800" b="1" dirty="0" smtClean="0">
-                <a:latin typeface="David" pitchFamily="34" charset="-79"/>
-                <a:cs typeface="David" pitchFamily="34" charset="-79"/>
-              </a:rPr>
-              <a:t>? בלבול של סמל השלום </a:t>
+                <a:latin typeface="David" pitchFamily="34" charset="-79"/>
+                <a:cs typeface="David" pitchFamily="34" charset="-79"/>
+              </a:rPr>
+              <a:t> </a:t>
             </a:r>
             <a:endParaRPr lang="he-IL" sz="2800" b="1" dirty="0">
               <a:latin typeface="David" pitchFamily="34" charset="-79"/>
@@ -9908,7 +9773,11 @@
                   <a:srgbClr val="00B050"/>
                 </a:solidFill>
               </a:rPr>
-              <a:t>י </a:t>
+              <a:t>ת </a:t>
+            </a:r>
+            <a:r>
+              <a:rPr lang="he-IL" sz="2800" b="1" dirty="0" smtClean="0"/>
+              <a:t>ש</a:t>
             </a:r>
             <a:r>
               <a:rPr lang="he-IL" sz="2800" b="1" dirty="0" smtClean="0">
@@ -9916,35 +9785,15 @@
                   <a:srgbClr val="0070C0"/>
                 </a:solidFill>
               </a:rPr>
-              <a:t>ו</a:t>
+              <a:t> ר </a:t>
             </a:r>
             <a:r>
               <a:rPr lang="he-IL" sz="2800" b="1" dirty="0" smtClean="0">
                 <a:solidFill>
-                  <a:srgbClr val="00B050"/>
-                </a:solidFill>
-              </a:rPr>
-              <a:t> </a:t>
-            </a:r>
-            <a:r>
-              <a:rPr lang="he-IL" sz="2800" b="1" dirty="0" smtClean="0"/>
-              <a:t>נ</a:t>
-            </a:r>
-            <a:r>
-              <a:rPr lang="he-IL" sz="2800" b="1" dirty="0" smtClean="0">
-                <a:solidFill>
-                  <a:srgbClr val="00B050"/>
-                </a:solidFill>
-              </a:rPr>
-              <a:t> </a:t>
-            </a:r>
-            <a:r>
-              <a:rPr lang="he-IL" sz="2800" b="1" dirty="0" smtClean="0">
-                <a:solidFill>
                   <a:srgbClr val="FF0000"/>
                 </a:solidFill>
               </a:rPr>
-              <a:t>ה</a:t>
+              <a:t>י</a:t>
             </a:r>
             <a:endParaRPr lang="he-IL" sz="2800" b="1" dirty="0">
               <a:solidFill>
@@ -10246,21 +10095,6 @@
 </file>
 
 <file path=customXml/item1.xml><?xml version="1.0" encoding="utf-8"?>
-<p:properties xmlns:p="http://schemas.microsoft.com/office/2006/metadata/properties" xmlns:xsi="http://www.w3.org/2001/XMLSchema-instance" xmlns:pc="http://schemas.microsoft.com/office/infopath/2007/PartnerControls">
-  <documentManagement/>
-</p:properties>
-</file>
-
-<file path=customXml/item2.xml><?xml version="1.0" encoding="utf-8"?>
-<?mso-contentType ?>
-<FormTemplates xmlns="http://schemas.microsoft.com/sharepoint/v3/contenttype/forms">
-  <Display>DocumentLibraryForm</Display>
-  <Edit>DocumentLibraryForm</Edit>
-  <New>DocumentLibraryForm</New>
-</FormTemplates>
-</file>
-
-<file path=customXml/item3.xml><?xml version="1.0" encoding="utf-8"?>
 <ct:contentTypeSchema xmlns:ct="http://schemas.microsoft.com/office/2006/metadata/contentType" xmlns:ma="http://schemas.microsoft.com/office/2006/metadata/properties/metaAttributes" ct:_="" ma:_="" ma:contentTypeName="Document" ma:contentTypeID="0x01010034C1E1491D9C694585E4D484013EA9D2" ma:contentTypeVersion="10" ma:contentTypeDescription="Create a new document." ma:contentTypeScope="" ma:versionID="91507b520f1bef10d7c938e8a3341699">
   <xsd:schema xmlns:xsd="http://www.w3.org/2001/XMLSchema" xmlns:xs="http://www.w3.org/2001/XMLSchema" xmlns:p="http://schemas.microsoft.com/office/2006/metadata/properties" xmlns:ns3="2d9e374d-705b-4978-9811-6b77dc0a0432" targetNamespace="http://schemas.microsoft.com/office/2006/metadata/properties" ma:root="true" ma:fieldsID="eba830c2d9bd07e7086f2609d364ba7a" ns3:_="">
     <xsd:import namespace="2d9e374d-705b-4978-9811-6b77dc0a0432"/>
@@ -10444,24 +10278,22 @@
 </ct:contentTypeSchema>
 </file>
 
-<file path=customXml/itemProps1.xml><?xml version="1.0" encoding="utf-8"?>
-<ds:datastoreItem xmlns:ds="http://schemas.openxmlformats.org/officeDocument/2006/customXml" ds:itemID="{473DE2F7-3404-40A0-A977-D87EA61FD0EF}">
-  <ds:schemaRefs>
-    <ds:schemaRef ds:uri="http://schemas.microsoft.com/office/2006/metadata/properties"/>
-    <ds:schemaRef ds:uri="http://schemas.microsoft.com/office/infopath/2007/PartnerControls"/>
-  </ds:schemaRefs>
-</ds:datastoreItem>
+<file path=customXml/item2.xml><?xml version="1.0" encoding="utf-8"?>
+<?mso-contentType ?>
+<FormTemplates xmlns="http://schemas.microsoft.com/sharepoint/v3/contenttype/forms">
+  <Display>DocumentLibraryForm</Display>
+  <Edit>DocumentLibraryForm</Edit>
+  <New>DocumentLibraryForm</New>
+</FormTemplates>
 </file>
 
-<file path=customXml/itemProps2.xml><?xml version="1.0" encoding="utf-8"?>
-<ds:datastoreItem xmlns:ds="http://schemas.openxmlformats.org/officeDocument/2006/customXml" ds:itemID="{C920FAB9-5C07-4863-ACC0-94F0CB535FAC}">
-  <ds:schemaRefs>
-    <ds:schemaRef ds:uri="http://schemas.microsoft.com/sharepoint/v3/contenttype/forms"/>
-  </ds:schemaRefs>
-</ds:datastoreItem>
+<file path=customXml/item3.xml><?xml version="1.0" encoding="utf-8"?>
+<p:properties xmlns:p="http://schemas.microsoft.com/office/2006/metadata/properties" xmlns:xsi="http://www.w3.org/2001/XMLSchema-instance" xmlns:pc="http://schemas.microsoft.com/office/infopath/2007/PartnerControls">
+  <documentManagement/>
+</p:properties>
 </file>
 
-<file path=customXml/itemProps3.xml><?xml version="1.0" encoding="utf-8"?>
+<file path=customXml/itemProps1.xml><?xml version="1.0" encoding="utf-8"?>
 <ds:datastoreItem xmlns:ds="http://schemas.openxmlformats.org/officeDocument/2006/customXml" ds:itemID="{2C42031F-DCFE-40C9-A63E-5D39E04D4562}">
   <ds:schemaRefs>
     <ds:schemaRef ds:uri="http://schemas.microsoft.com/office/2006/metadata/contentType"/>
@@ -10477,4 +10309,21 @@
     <ds:schemaRef ds:uri="http://schemas.microsoft.com/internal/obd"/>
   </ds:schemaRefs>
 </ds:datastoreItem>
+</file>
+
+<file path=customXml/itemProps2.xml><?xml version="1.0" encoding="utf-8"?>
+<ds:datastoreItem xmlns:ds="http://schemas.openxmlformats.org/officeDocument/2006/customXml" ds:itemID="{C920FAB9-5C07-4863-ACC0-94F0CB535FAC}">
+  <ds:schemaRefs>
+    <ds:schemaRef ds:uri="http://schemas.microsoft.com/sharepoint/v3/contenttype/forms"/>
+  </ds:schemaRefs>
+</ds:datastoreItem>
+</file>
+
+<file path=customXml/itemProps3.xml><?xml version="1.0" encoding="utf-8"?>
+<ds:datastoreItem xmlns:ds="http://schemas.openxmlformats.org/officeDocument/2006/customXml" ds:itemID="{473DE2F7-3404-40A0-A977-D87EA61FD0EF}">
+  <ds:schemaRefs>
+    <ds:schemaRef ds:uri="http://schemas.microsoft.com/office/2006/metadata/properties"/>
+    <ds:schemaRef ds:uri="http://schemas.microsoft.com/office/infopath/2007/PartnerControls"/>
+  </ds:schemaRefs>
+</ds:datastoreItem>
 </file>
</xml_diff>

<commit_message>
Riddles for Horashim 2022 - Final
</commit_message>
<xml_diff>
--- a/events/Horashim_2022/חידות_הגיון_לניווט_חורשים_2022_סתיו.pptx
+++ b/events/Horashim_2022/חידות_הגיון_לניווט_חורשים_2022_סתיו.pptx
@@ -122,7 +122,7 @@
   </p:defaultTextStyle>
   <p:extLst>
     <p:ext uri="{EFAFB233-063F-42B5-8137-9DF3F51BA10A}">
-      <p15:sldGuideLst xmlns="" xmlns:p15="http://schemas.microsoft.com/office/powerpoint/2012/main">
+      <p15:sldGuideLst xmlns:p15="http://schemas.microsoft.com/office/powerpoint/2012/main" xmlns="">
         <p15:guide id="1" orient="horz" pos="2160">
           <p15:clr>
             <a:srgbClr val="A4A3A4"/>
@@ -3580,7 +3580,7 @@
         </p:spPr>
         <p:txBody>
           <a:bodyPr>
-            <a:normAutofit fontScale="85000" lnSpcReduction="10000"/>
+            <a:normAutofit fontScale="85000" lnSpcReduction="20000"/>
           </a:bodyPr>
           <a:lstStyle/>
           <a:p>
@@ -3589,7 +3589,15 @@
             </a:pPr>
             <a:r>
               <a:rPr lang="he-IL" sz="6600" dirty="0" smtClean="0"/>
-              <a:t>תופעה: כשל וצלע לכיוון דרום</a:t>
+              <a:t>תופעה: </a:t>
+            </a:r>
+            <a:r>
+              <a:rPr lang="he-IL" sz="6600" dirty="0" smtClean="0"/>
+              <a:t>נכשל </a:t>
+            </a:r>
+            <a:r>
+              <a:rPr lang="he-IL" sz="6600" dirty="0" smtClean="0"/>
+              <a:t>וצלע לכיוון דרום</a:t>
             </a:r>
           </a:p>
           <a:p>
@@ -3606,31 +3614,7 @@
                 <a:latin typeface="David" pitchFamily="34" charset="-79"/>
                 <a:cs typeface="David" pitchFamily="34" charset="-79"/>
               </a:rPr>
-              <a:t>( </a:t>
-            </a:r>
-            <a:r>
-              <a:rPr lang="he-IL" sz="8000" dirty="0" smtClean="0">
-                <a:solidFill>
-                  <a:schemeClr val="accent6">
-                    <a:lumMod val="75000"/>
-                  </a:schemeClr>
-                </a:solidFill>
-                <a:latin typeface="David" pitchFamily="34" charset="-79"/>
-                <a:cs typeface="David" pitchFamily="34" charset="-79"/>
-              </a:rPr>
-              <a:t>נ _ </a:t>
-            </a:r>
-            <a:r>
-              <a:rPr lang="he-IL" sz="8000" dirty="0" smtClean="0">
-                <a:solidFill>
-                  <a:schemeClr val="accent6">
-                    <a:lumMod val="75000"/>
-                  </a:schemeClr>
-                </a:solidFill>
-                <a:latin typeface="David" pitchFamily="34" charset="-79"/>
-                <a:cs typeface="David" pitchFamily="34" charset="-79"/>
-              </a:rPr>
-              <a:t>_ _ _ )</a:t>
+              <a:t>( נ _ _ _ _ )</a:t>
             </a:r>
           </a:p>
           <a:p>
@@ -3828,21 +3812,8 @@
                   <a:srgbClr val="0070C0"/>
                 </a:solidFill>
               </a:rPr>
-              <a:t>פתרון חידה </a:t>
-            </a:r>
-            <a:r>
-              <a:rPr lang="he-IL" sz="2400" dirty="0" smtClean="0">
-                <a:solidFill>
-                  <a:srgbClr val="0070C0"/>
-                </a:solidFill>
-              </a:rPr>
-              <a:t>5</a:t>
-            </a:r>
-            <a:endParaRPr lang="he-IL" sz="2400" dirty="0" smtClean="0">
-              <a:solidFill>
-                <a:srgbClr val="0070C0"/>
-              </a:solidFill>
-            </a:endParaRPr>
+              <a:t>פתרון חידה 5</a:t>
+            </a:r>
           </a:p>
           <a:p>
             <a:pPr algn="ctr"/>
@@ -3993,19 +3964,7 @@
                 <a:latin typeface="David" pitchFamily="34" charset="-79"/>
                 <a:cs typeface="David" pitchFamily="34" charset="-79"/>
               </a:rPr>
-              <a:t>_ _ </a:t>
-            </a:r>
-            <a:r>
-              <a:rPr lang="he-IL" sz="8000" dirty="0" smtClean="0">
-                <a:solidFill>
-                  <a:schemeClr val="accent6">
-                    <a:lumMod val="75000"/>
-                  </a:schemeClr>
-                </a:solidFill>
-                <a:latin typeface="David" pitchFamily="34" charset="-79"/>
-                <a:cs typeface="David" pitchFamily="34" charset="-79"/>
-              </a:rPr>
-              <a:t>_ </a:t>
+              <a:t>_ _ _ </a:t>
             </a:r>
             <a:r>
               <a:rPr lang="he-IL" sz="8000" dirty="0">
@@ -4421,31 +4380,7 @@
                 <a:latin typeface="David" pitchFamily="34" charset="-79"/>
                 <a:cs typeface="David" pitchFamily="34" charset="-79"/>
               </a:rPr>
-              <a:t>( </a:t>
-            </a:r>
-            <a:r>
-              <a:rPr lang="he-IL" sz="8000" dirty="0" smtClean="0">
-                <a:solidFill>
-                  <a:schemeClr val="accent6">
-                    <a:lumMod val="75000"/>
-                  </a:schemeClr>
-                </a:solidFill>
-                <a:latin typeface="David" pitchFamily="34" charset="-79"/>
-                <a:cs typeface="David" pitchFamily="34" charset="-79"/>
-              </a:rPr>
-              <a:t>ש </a:t>
-            </a:r>
-            <a:r>
-              <a:rPr lang="he-IL" sz="8000" dirty="0" smtClean="0">
-                <a:solidFill>
-                  <a:schemeClr val="accent6">
-                    <a:lumMod val="75000"/>
-                  </a:schemeClr>
-                </a:solidFill>
-                <a:latin typeface="David" pitchFamily="34" charset="-79"/>
-                <a:cs typeface="David" pitchFamily="34" charset="-79"/>
-              </a:rPr>
-              <a:t>_ _ _ )</a:t>
+              <a:t>( ש _ _ _ )</a:t>
             </a:r>
           </a:p>
           <a:p>
@@ -4643,21 +4578,8 @@
                   <a:srgbClr val="0070C0"/>
                 </a:solidFill>
               </a:rPr>
-              <a:t>פתרון חידה </a:t>
-            </a:r>
-            <a:r>
-              <a:rPr lang="he-IL" sz="2400" dirty="0" smtClean="0">
-                <a:solidFill>
-                  <a:srgbClr val="0070C0"/>
-                </a:solidFill>
-              </a:rPr>
-              <a:t>6</a:t>
-            </a:r>
-            <a:endParaRPr lang="he-IL" sz="2400" dirty="0" smtClean="0">
-              <a:solidFill>
-                <a:srgbClr val="0070C0"/>
-              </a:solidFill>
-            </a:endParaRPr>
+              <a:t>פתרון חידה 6</a:t>
+            </a:r>
           </a:p>
           <a:p>
             <a:pPr algn="ctr"/>
@@ -5091,17 +5013,7 @@
                 <a:latin typeface="David" pitchFamily="34" charset="-79"/>
                 <a:cs typeface="David" pitchFamily="34" charset="-79"/>
               </a:rPr>
-              <a:t>קבוצה</a:t>
-            </a:r>
-            <a:r>
-              <a:rPr lang="he-IL" sz="2800" b="1" dirty="0" smtClean="0">
-                <a:solidFill>
-                  <a:srgbClr val="FF0000"/>
-                </a:solidFill>
-                <a:latin typeface="David" pitchFamily="34" charset="-79"/>
-                <a:cs typeface="David" pitchFamily="34" charset="-79"/>
-              </a:rPr>
-              <a:t> </a:t>
+              <a:t>קבוצה </a:t>
             </a:r>
             <a:endParaRPr lang="he-IL" sz="2800" b="1" dirty="0">
               <a:solidFill>
@@ -5253,31 +5165,7 @@
                 <a:latin typeface="David" pitchFamily="34" charset="-79"/>
                 <a:cs typeface="David" pitchFamily="34" charset="-79"/>
               </a:rPr>
-              <a:t>( </a:t>
-            </a:r>
-            <a:r>
-              <a:rPr lang="he-IL" sz="8000" dirty="0" smtClean="0">
-                <a:solidFill>
-                  <a:schemeClr val="accent6">
-                    <a:lumMod val="75000"/>
-                  </a:schemeClr>
-                </a:solidFill>
-                <a:latin typeface="David" pitchFamily="34" charset="-79"/>
-                <a:cs typeface="David" pitchFamily="34" charset="-79"/>
-              </a:rPr>
-              <a:t>ח _ </a:t>
-            </a:r>
-            <a:r>
-              <a:rPr lang="he-IL" sz="8000" dirty="0" smtClean="0">
-                <a:solidFill>
-                  <a:schemeClr val="accent6">
-                    <a:lumMod val="75000"/>
-                  </a:schemeClr>
-                </a:solidFill>
-                <a:latin typeface="David" pitchFamily="34" charset="-79"/>
-                <a:cs typeface="David" pitchFamily="34" charset="-79"/>
-              </a:rPr>
-              <a:t>_ _ _ )</a:t>
+              <a:t>( ח _ _ _ _ )</a:t>
             </a:r>
           </a:p>
           <a:p>
@@ -5475,21 +5363,8 @@
                   <a:srgbClr val="0070C0"/>
                 </a:solidFill>
               </a:rPr>
-              <a:t>פתרון </a:t>
-            </a:r>
-            <a:r>
-              <a:rPr lang="he-IL" sz="2400" dirty="0" smtClean="0">
-                <a:solidFill>
-                  <a:srgbClr val="0070C0"/>
-                </a:solidFill>
-              </a:rPr>
-              <a:t>חידה 7</a:t>
-            </a:r>
-            <a:endParaRPr lang="he-IL" sz="2400" dirty="0" smtClean="0">
-              <a:solidFill>
-                <a:srgbClr val="0070C0"/>
-              </a:solidFill>
-            </a:endParaRPr>
+              <a:t>פתרון חידה 7</a:t>
+            </a:r>
           </a:p>
           <a:p>
             <a:pPr algn="ctr"/>
@@ -5647,19 +5522,7 @@
                 <a:latin typeface="David" pitchFamily="34" charset="-79"/>
                 <a:cs typeface="David" pitchFamily="34" charset="-79"/>
               </a:rPr>
-              <a:t>_ </a:t>
-            </a:r>
-            <a:r>
-              <a:rPr lang="he-IL" sz="8000" dirty="0" smtClean="0">
-                <a:solidFill>
-                  <a:schemeClr val="accent6">
-                    <a:lumMod val="75000"/>
-                  </a:schemeClr>
-                </a:solidFill>
-                <a:latin typeface="David" pitchFamily="34" charset="-79"/>
-                <a:cs typeface="David" pitchFamily="34" charset="-79"/>
-              </a:rPr>
-              <a:t>_ _ </a:t>
+              <a:t>_ _ _ </a:t>
             </a:r>
             <a:r>
               <a:rPr lang="he-IL" sz="8000" dirty="0">
@@ -5869,21 +5732,8 @@
                   <a:srgbClr val="0070C0"/>
                 </a:solidFill>
               </a:rPr>
-              <a:t>פתרון חידה </a:t>
-            </a:r>
-            <a:r>
-              <a:rPr lang="he-IL" sz="2400" dirty="0" smtClean="0">
-                <a:solidFill>
-                  <a:srgbClr val="0070C0"/>
-                </a:solidFill>
-              </a:rPr>
-              <a:t>7</a:t>
-            </a:r>
-            <a:endParaRPr lang="he-IL" sz="2400" dirty="0" smtClean="0">
-              <a:solidFill>
-                <a:srgbClr val="0070C0"/>
-              </a:solidFill>
-            </a:endParaRPr>
+              <a:t>פתרון חידה 7</a:t>
+            </a:r>
           </a:p>
           <a:p>
             <a:pPr algn="ctr"/>
@@ -5935,17 +5785,7 @@
                 <a:latin typeface="David" pitchFamily="34" charset="-79"/>
                 <a:cs typeface="David" pitchFamily="34" charset="-79"/>
               </a:rPr>
-              <a:t>גפה</a:t>
-            </a:r>
-            <a:r>
-              <a:rPr lang="he-IL" sz="2800" b="1" dirty="0" smtClean="0">
-                <a:solidFill>
-                  <a:srgbClr val="FF0000"/>
-                </a:solidFill>
-                <a:latin typeface="David" pitchFamily="34" charset="-79"/>
-                <a:cs typeface="David" pitchFamily="34" charset="-79"/>
-              </a:rPr>
-              <a:t> </a:t>
+              <a:t>גפה </a:t>
             </a:r>
             <a:endParaRPr lang="he-IL" sz="2800" b="1" dirty="0">
               <a:solidFill>
@@ -6097,31 +5937,7 @@
                 <a:latin typeface="David" pitchFamily="34" charset="-79"/>
                 <a:cs typeface="David" pitchFamily="34" charset="-79"/>
               </a:rPr>
-              <a:t>( </a:t>
-            </a:r>
-            <a:r>
-              <a:rPr lang="he-IL" sz="8000" dirty="0" smtClean="0">
-                <a:solidFill>
-                  <a:schemeClr val="accent6">
-                    <a:lumMod val="75000"/>
-                  </a:schemeClr>
-                </a:solidFill>
-                <a:latin typeface="David" pitchFamily="34" charset="-79"/>
-                <a:cs typeface="David" pitchFamily="34" charset="-79"/>
-              </a:rPr>
-              <a:t>ס </a:t>
-            </a:r>
-            <a:r>
-              <a:rPr lang="he-IL" sz="8000" dirty="0" smtClean="0">
-                <a:solidFill>
-                  <a:schemeClr val="accent6">
-                    <a:lumMod val="75000"/>
-                  </a:schemeClr>
-                </a:solidFill>
-                <a:latin typeface="David" pitchFamily="34" charset="-79"/>
-                <a:cs typeface="David" pitchFamily="34" charset="-79"/>
-              </a:rPr>
-              <a:t>_ _ _ )</a:t>
+              <a:t>( ס _ _ _ )</a:t>
             </a:r>
           </a:p>
           <a:p>
@@ -6442,15 +6258,19 @@
             </a:pPr>
             <a:r>
               <a:rPr lang="he-IL" dirty="0" smtClean="0"/>
-              <a:t>1.  כרכום - פרח </a:t>
-            </a:r>
-            <a:r>
-              <a:rPr lang="he-IL" dirty="0" err="1" smtClean="0"/>
-              <a:t>סתיווי</a:t>
+              <a:t>1.  כרכום - </a:t>
+            </a:r>
+            <a:r>
+              <a:rPr lang="he-IL" smtClean="0"/>
+              <a:t>פרח </a:t>
+            </a:r>
+            <a:r>
+              <a:rPr lang="he-IL" smtClean="0"/>
+              <a:t>סתווי </a:t>
             </a:r>
             <a:r>
               <a:rPr lang="he-IL" dirty="0" smtClean="0"/>
-              <a:t> מרוכך ומבולבל</a:t>
+              <a:t>מרוכך ומבולבל</a:t>
             </a:r>
           </a:p>
           <a:p>
@@ -6468,7 +6288,15 @@
             </a:pPr>
             <a:r>
               <a:rPr lang="he-IL" dirty="0" smtClean="0"/>
-              <a:t>3.  יורה - ילמד משקע בסתיו</a:t>
+              <a:t>3.  יורה </a:t>
+            </a:r>
+            <a:r>
+              <a:rPr lang="he-IL" dirty="0" smtClean="0"/>
+              <a:t>– ידריך משקע </a:t>
+            </a:r>
+            <a:r>
+              <a:rPr lang="he-IL" dirty="0" smtClean="0"/>
+              <a:t>בסתיו</a:t>
             </a:r>
           </a:p>
           <a:p>
@@ -6486,7 +6314,15 @@
             </a:pPr>
             <a:r>
               <a:rPr lang="he-IL" dirty="0" smtClean="0"/>
-              <a:t>5.  נדידה - תופעה: כשל וצלע לכיוון דרום</a:t>
+              <a:t>5.  נדידה - תופעה: </a:t>
+            </a:r>
+            <a:r>
+              <a:rPr lang="he-IL" dirty="0" smtClean="0"/>
+              <a:t>נכשל </a:t>
+            </a:r>
+            <a:r>
+              <a:rPr lang="he-IL" dirty="0" smtClean="0"/>
+              <a:t>וצלע לכיוון דרום</a:t>
             </a:r>
           </a:p>
           <a:p>
@@ -6513,11 +6349,7 @@
             </a:pPr>
             <a:r>
               <a:rPr lang="he-IL" dirty="0" smtClean="0"/>
-              <a:t>8.  </a:t>
-            </a:r>
-            <a:r>
-              <a:rPr lang="he-IL" smtClean="0"/>
-              <a:t>סתיו - יוסת אחרת העונה</a:t>
+              <a:t>8.  סתיו - יוסת אחרת העונה</a:t>
             </a:r>
             <a:endParaRPr lang="he-IL" dirty="0"/>
           </a:p>
@@ -7842,7 +7674,7 @@
             </a:pPr>
             <a:r>
               <a:rPr lang="he-IL" sz="6600" dirty="0" smtClean="0"/>
-              <a:t>ילמד משקע </a:t>
+              <a:t>ידריך משקע </a:t>
             </a:r>
             <a:r>
               <a:rPr lang="he-IL" sz="6600" dirty="0" smtClean="0"/>
@@ -7863,43 +7695,7 @@
                 <a:latin typeface="David" pitchFamily="34" charset="-79"/>
                 <a:cs typeface="David" pitchFamily="34" charset="-79"/>
               </a:rPr>
-              <a:t>( </a:t>
-            </a:r>
-            <a:r>
-              <a:rPr lang="he-IL" sz="8000" dirty="0" smtClean="0">
-                <a:solidFill>
-                  <a:schemeClr val="accent6">
-                    <a:lumMod val="75000"/>
-                  </a:schemeClr>
-                </a:solidFill>
-                <a:latin typeface="David" pitchFamily="34" charset="-79"/>
-                <a:cs typeface="David" pitchFamily="34" charset="-79"/>
-              </a:rPr>
-              <a:t>_ </a:t>
-            </a:r>
-            <a:r>
-              <a:rPr lang="he-IL" sz="8000" dirty="0" smtClean="0">
-                <a:solidFill>
-                  <a:schemeClr val="accent6">
-                    <a:lumMod val="75000"/>
-                  </a:schemeClr>
-                </a:solidFill>
-                <a:latin typeface="David" pitchFamily="34" charset="-79"/>
-                <a:cs typeface="David" pitchFamily="34" charset="-79"/>
-              </a:rPr>
-              <a:t>_ _ </a:t>
-            </a:r>
-            <a:r>
-              <a:rPr lang="he-IL" sz="8000" dirty="0" smtClean="0">
-                <a:solidFill>
-                  <a:schemeClr val="accent6">
-                    <a:lumMod val="75000"/>
-                  </a:schemeClr>
-                </a:solidFill>
-                <a:latin typeface="David" pitchFamily="34" charset="-79"/>
-                <a:cs typeface="David" pitchFamily="34" charset="-79"/>
-              </a:rPr>
-              <a:t>_ </a:t>
+              <a:t>( _ _ _ _ </a:t>
             </a:r>
             <a:r>
               <a:rPr lang="he-IL" sz="8000" dirty="0">
@@ -8266,7 +8062,11 @@
             </a:pPr>
             <a:r>
               <a:rPr lang="he-IL" sz="6600" dirty="0" smtClean="0"/>
-              <a:t>ילמד משקע בסתיו</a:t>
+              <a:t>ידריך משקע </a:t>
+            </a:r>
+            <a:r>
+              <a:rPr lang="he-IL" sz="6600" dirty="0" smtClean="0"/>
+              <a:t>בסתיו</a:t>
             </a:r>
           </a:p>
           <a:p>
@@ -8682,19 +8482,7 @@
                 <a:latin typeface="David" pitchFamily="34" charset="-79"/>
                 <a:cs typeface="David" pitchFamily="34" charset="-79"/>
               </a:rPr>
-              <a:t>_ </a:t>
-            </a:r>
-            <a:r>
-              <a:rPr lang="he-IL" sz="8000" dirty="0" smtClean="0">
-                <a:solidFill>
-                  <a:schemeClr val="accent6">
-                    <a:lumMod val="75000"/>
-                  </a:schemeClr>
-                </a:solidFill>
-                <a:latin typeface="David" pitchFamily="34" charset="-79"/>
-                <a:cs typeface="David" pitchFamily="34" charset="-79"/>
-              </a:rPr>
-              <a:t>_ </a:t>
+              <a:t>_ _ </a:t>
             </a:r>
             <a:r>
               <a:rPr lang="he-IL" sz="8000" dirty="0">
@@ -9080,19 +8868,7 @@
                 <a:latin typeface="David" pitchFamily="34" charset="-79"/>
                 <a:cs typeface="David" pitchFamily="34" charset="-79"/>
               </a:rPr>
-              <a:t>ת _ </a:t>
-            </a:r>
-            <a:r>
-              <a:rPr lang="he-IL" sz="8000" dirty="0" smtClean="0">
-                <a:solidFill>
-                  <a:schemeClr val="accent6">
-                    <a:lumMod val="75000"/>
-                  </a:schemeClr>
-                </a:solidFill>
-                <a:latin typeface="David" pitchFamily="34" charset="-79"/>
-                <a:cs typeface="David" pitchFamily="34" charset="-79"/>
-              </a:rPr>
-              <a:t>_ </a:t>
+              <a:t>ת _ _ </a:t>
             </a:r>
             <a:r>
               <a:rPr lang="he-IL" sz="8000" dirty="0">
@@ -9302,21 +9078,8 @@
                   <a:srgbClr val="0070C0"/>
                 </a:solidFill>
               </a:rPr>
-              <a:t>פתרון חידה </a:t>
-            </a:r>
-            <a:r>
-              <a:rPr lang="he-IL" sz="2400" dirty="0" smtClean="0">
-                <a:solidFill>
-                  <a:srgbClr val="0070C0"/>
-                </a:solidFill>
-              </a:rPr>
-              <a:t>4</a:t>
-            </a:r>
-            <a:endParaRPr lang="he-IL" sz="2400" dirty="0" smtClean="0">
-              <a:solidFill>
-                <a:srgbClr val="0070C0"/>
-              </a:solidFill>
-            </a:endParaRPr>
+              <a:t>פתרון חידה 4</a:t>
+            </a:r>
           </a:p>
           <a:p>
             <a:pPr algn="ctr"/>
@@ -9418,7 +9181,7 @@
         </p:spPr>
         <p:txBody>
           <a:bodyPr>
-            <a:normAutofit fontScale="85000" lnSpcReduction="10000"/>
+            <a:normAutofit fontScale="85000" lnSpcReduction="20000"/>
           </a:bodyPr>
           <a:lstStyle/>
           <a:p>
@@ -9427,7 +9190,15 @@
             </a:pPr>
             <a:r>
               <a:rPr lang="he-IL" sz="6600" dirty="0" smtClean="0"/>
-              <a:t>תופעה: כשל וצלע לכיוון דרום</a:t>
+              <a:t>תופעה: </a:t>
+            </a:r>
+            <a:r>
+              <a:rPr lang="he-IL" sz="6600" dirty="0" smtClean="0"/>
+              <a:t>נכשל </a:t>
+            </a:r>
+            <a:r>
+              <a:rPr lang="he-IL" sz="6600" dirty="0" smtClean="0"/>
+              <a:t>וצלע לכיוון דרום</a:t>
             </a:r>
             <a:endParaRPr lang="he-IL" sz="6600" dirty="0"/>
           </a:p>
@@ -9457,19 +9228,7 @@
                 <a:latin typeface="David" pitchFamily="34" charset="-79"/>
                 <a:cs typeface="David" pitchFamily="34" charset="-79"/>
               </a:rPr>
-              <a:t>_ _ </a:t>
-            </a:r>
-            <a:r>
-              <a:rPr lang="he-IL" sz="8000" dirty="0" smtClean="0">
-                <a:solidFill>
-                  <a:schemeClr val="accent6">
-                    <a:lumMod val="75000"/>
-                  </a:schemeClr>
-                </a:solidFill>
-                <a:latin typeface="David" pitchFamily="34" charset="-79"/>
-                <a:cs typeface="David" pitchFamily="34" charset="-79"/>
-              </a:rPr>
-              <a:t>_ </a:t>
+              <a:t>_ _ _ </a:t>
             </a:r>
             <a:r>
               <a:rPr lang="he-IL" sz="8000" dirty="0">
@@ -9749,14 +9508,7 @@
                 <a:latin typeface="David" pitchFamily="34" charset="-79"/>
                 <a:cs typeface="David" pitchFamily="34" charset="-79"/>
               </a:rPr>
-              <a:t> בבלבול חודש</a:t>
-            </a:r>
-            <a:r>
-              <a:rPr lang="he-IL" sz="2800" b="1" dirty="0" smtClean="0">
-                <a:latin typeface="David" pitchFamily="34" charset="-79"/>
-                <a:cs typeface="David" pitchFamily="34" charset="-79"/>
-              </a:rPr>
-              <a:t> </a:t>
+              <a:t> בבלבול חודש </a:t>
             </a:r>
             <a:endParaRPr lang="he-IL" sz="2800" b="1" dirty="0">
               <a:latin typeface="David" pitchFamily="34" charset="-79"/>
@@ -10095,6 +9847,21 @@
 </file>
 
 <file path=customXml/item1.xml><?xml version="1.0" encoding="utf-8"?>
+<p:properties xmlns:p="http://schemas.microsoft.com/office/2006/metadata/properties" xmlns:xsi="http://www.w3.org/2001/XMLSchema-instance" xmlns:pc="http://schemas.microsoft.com/office/infopath/2007/PartnerControls">
+  <documentManagement/>
+</p:properties>
+</file>
+
+<file path=customXml/item2.xml><?xml version="1.0" encoding="utf-8"?>
+<?mso-contentType ?>
+<FormTemplates xmlns="http://schemas.microsoft.com/sharepoint/v3/contenttype/forms">
+  <Display>DocumentLibraryForm</Display>
+  <Edit>DocumentLibraryForm</Edit>
+  <New>DocumentLibraryForm</New>
+</FormTemplates>
+</file>
+
+<file path=customXml/item3.xml><?xml version="1.0" encoding="utf-8"?>
 <ct:contentTypeSchema xmlns:ct="http://schemas.microsoft.com/office/2006/metadata/contentType" xmlns:ma="http://schemas.microsoft.com/office/2006/metadata/properties/metaAttributes" ct:_="" ma:_="" ma:contentTypeName="Document" ma:contentTypeID="0x01010034C1E1491D9C694585E4D484013EA9D2" ma:contentTypeVersion="10" ma:contentTypeDescription="Create a new document." ma:contentTypeScope="" ma:versionID="91507b520f1bef10d7c938e8a3341699">
   <xsd:schema xmlns:xsd="http://www.w3.org/2001/XMLSchema" xmlns:xs="http://www.w3.org/2001/XMLSchema" xmlns:p="http://schemas.microsoft.com/office/2006/metadata/properties" xmlns:ns3="2d9e374d-705b-4978-9811-6b77dc0a0432" targetNamespace="http://schemas.microsoft.com/office/2006/metadata/properties" ma:root="true" ma:fieldsID="eba830c2d9bd07e7086f2609d364ba7a" ns3:_="">
     <xsd:import namespace="2d9e374d-705b-4978-9811-6b77dc0a0432"/>
@@ -10278,22 +10045,24 @@
 </ct:contentTypeSchema>
 </file>
 
-<file path=customXml/item2.xml><?xml version="1.0" encoding="utf-8"?>
-<?mso-contentType ?>
-<FormTemplates xmlns="http://schemas.microsoft.com/sharepoint/v3/contenttype/forms">
-  <Display>DocumentLibraryForm</Display>
-  <Edit>DocumentLibraryForm</Edit>
-  <New>DocumentLibraryForm</New>
-</FormTemplates>
+<file path=customXml/itemProps1.xml><?xml version="1.0" encoding="utf-8"?>
+<ds:datastoreItem xmlns:ds="http://schemas.openxmlformats.org/officeDocument/2006/customXml" ds:itemID="{473DE2F7-3404-40A0-A977-D87EA61FD0EF}">
+  <ds:schemaRefs>
+    <ds:schemaRef ds:uri="http://schemas.microsoft.com/office/2006/metadata/properties"/>
+    <ds:schemaRef ds:uri="http://schemas.microsoft.com/office/infopath/2007/PartnerControls"/>
+  </ds:schemaRefs>
+</ds:datastoreItem>
 </file>
 
-<file path=customXml/item3.xml><?xml version="1.0" encoding="utf-8"?>
-<p:properties xmlns:p="http://schemas.microsoft.com/office/2006/metadata/properties" xmlns:xsi="http://www.w3.org/2001/XMLSchema-instance" xmlns:pc="http://schemas.microsoft.com/office/infopath/2007/PartnerControls">
-  <documentManagement/>
-</p:properties>
+<file path=customXml/itemProps2.xml><?xml version="1.0" encoding="utf-8"?>
+<ds:datastoreItem xmlns:ds="http://schemas.openxmlformats.org/officeDocument/2006/customXml" ds:itemID="{C920FAB9-5C07-4863-ACC0-94F0CB535FAC}">
+  <ds:schemaRefs>
+    <ds:schemaRef ds:uri="http://schemas.microsoft.com/sharepoint/v3/contenttype/forms"/>
+  </ds:schemaRefs>
+</ds:datastoreItem>
 </file>
 
-<file path=customXml/itemProps1.xml><?xml version="1.0" encoding="utf-8"?>
+<file path=customXml/itemProps3.xml><?xml version="1.0" encoding="utf-8"?>
 <ds:datastoreItem xmlns:ds="http://schemas.openxmlformats.org/officeDocument/2006/customXml" ds:itemID="{2C42031F-DCFE-40C9-A63E-5D39E04D4562}">
   <ds:schemaRefs>
     <ds:schemaRef ds:uri="http://schemas.microsoft.com/office/2006/metadata/contentType"/>
@@ -10309,21 +10078,4 @@
     <ds:schemaRef ds:uri="http://schemas.microsoft.com/internal/obd"/>
   </ds:schemaRefs>
 </ds:datastoreItem>
-</file>
-
-<file path=customXml/itemProps2.xml><?xml version="1.0" encoding="utf-8"?>
-<ds:datastoreItem xmlns:ds="http://schemas.openxmlformats.org/officeDocument/2006/customXml" ds:itemID="{C920FAB9-5C07-4863-ACC0-94F0CB535FAC}">
-  <ds:schemaRefs>
-    <ds:schemaRef ds:uri="http://schemas.microsoft.com/sharepoint/v3/contenttype/forms"/>
-  </ds:schemaRefs>
-</ds:datastoreItem>
-</file>
-
-<file path=customXml/itemProps3.xml><?xml version="1.0" encoding="utf-8"?>
-<ds:datastoreItem xmlns:ds="http://schemas.openxmlformats.org/officeDocument/2006/customXml" ds:itemID="{473DE2F7-3404-40A0-A977-D87EA61FD0EF}">
-  <ds:schemaRefs>
-    <ds:schemaRef ds:uri="http://schemas.microsoft.com/office/2006/metadata/properties"/>
-    <ds:schemaRef ds:uri="http://schemas.microsoft.com/office/infopath/2007/PartnerControls"/>
-  </ds:schemaRefs>
-</ds:datastoreItem>
 </file>
</xml_diff>